<commit_message>
adjustments to notebook and readme file
</commit_message>
<xml_diff>
--- a/Exploring perth house prices.pptx
+++ b/Exploring perth house prices.pptx
@@ -5,7 +5,7 @@
     <p:sldMasterId id="2147483648" r:id="rId1"/>
   </p:sldMasterIdLst>
   <p:notesMasterIdLst>
-    <p:notesMasterId r:id="rId14"/>
+    <p:notesMasterId r:id="rId15"/>
   </p:notesMasterIdLst>
   <p:sldIdLst>
     <p:sldId id="256" r:id="rId2"/>
@@ -20,6 +20,7 @@
     <p:sldId id="267" r:id="rId11"/>
     <p:sldId id="266" r:id="rId12"/>
     <p:sldId id="272" r:id="rId13"/>
+    <p:sldId id="273" r:id="rId14"/>
   </p:sldIdLst>
   <p:sldSz cx="12192000" cy="6858000"/>
   <p:notesSz cx="6858000" cy="9144000"/>
@@ -1475,7 +1476,7 @@
   <dgm:whole/>
   <dgm:extLst>
     <a:ext uri="http://schemas.microsoft.com/office/drawing/2008/diagram">
-      <dsp:dataModelExt xmlns:dsp="http://schemas.microsoft.com/office/drawing/2008/diagram" relId="rId9" minVer="http://schemas.openxmlformats.org/drawingml/2006/diagram"/>
+      <dsp:dataModelExt xmlns:dsp="http://schemas.microsoft.com/office/drawing/2008/diagram" relId="rId8" minVer="http://schemas.openxmlformats.org/drawingml/2006/diagram"/>
     </a:ext>
   </dgm:extLst>
 </dgm:dataModel>
@@ -3649,7 +3650,7 @@
           <a:p>
             <a:fld id="{C044FC31-B28D-47B3-AEBC-64ECB8F8BE2D}" type="datetimeFigureOut">
               <a:rPr lang="en-AU" smtClean="0"/>
-              <a:t>29/05/2023</a:t>
+              <a:t>30/05/2023</a:t>
             </a:fld>
             <a:endParaRPr lang="en-AU"/>
           </a:p>
@@ -4004,6 +4005,90 @@
 </p:notes>
 </file>
 
+<file path=ppt/notesSlides/notesSlide10.xml><?xml version="1.0" encoding="utf-8"?>
+<p:notes xmlns:a="http://schemas.openxmlformats.org/drawingml/2006/main" xmlns:r="http://schemas.openxmlformats.org/officeDocument/2006/relationships" xmlns:p="http://schemas.openxmlformats.org/presentationml/2006/main">
+  <p:cSld>
+    <p:spTree>
+      <p:nvGrpSpPr>
+        <p:cNvPr id="1" name=""/>
+        <p:cNvGrpSpPr/>
+        <p:nvPr/>
+      </p:nvGrpSpPr>
+      <p:grpSpPr>
+        <a:xfrm>
+          <a:off x="0" y="0"/>
+          <a:ext cx="0" cy="0"/>
+          <a:chOff x="0" y="0"/>
+          <a:chExt cx="0" cy="0"/>
+        </a:xfrm>
+      </p:grpSpPr>
+      <p:sp>
+        <p:nvSpPr>
+          <p:cNvPr id="2" name="Slide Image Placeholder 1"/>
+          <p:cNvSpPr>
+            <a:spLocks noGrp="1" noRot="1" noChangeAspect="1"/>
+          </p:cNvSpPr>
+          <p:nvPr>
+            <p:ph type="sldImg"/>
+          </p:nvPr>
+        </p:nvSpPr>
+        <p:spPr/>
+      </p:sp>
+      <p:sp>
+        <p:nvSpPr>
+          <p:cNvPr id="3" name="Notes Placeholder 2"/>
+          <p:cNvSpPr>
+            <a:spLocks noGrp="1"/>
+          </p:cNvSpPr>
+          <p:nvPr>
+            <p:ph type="body" idx="1"/>
+          </p:nvPr>
+        </p:nvSpPr>
+        <p:spPr/>
+        <p:txBody>
+          <a:bodyPr/>
+          <a:lstStyle/>
+          <a:p>
+            <a:endParaRPr lang="en-AU" dirty="0"/>
+          </a:p>
+        </p:txBody>
+      </p:sp>
+      <p:sp>
+        <p:nvSpPr>
+          <p:cNvPr id="4" name="Slide Number Placeholder 3"/>
+          <p:cNvSpPr>
+            <a:spLocks noGrp="1"/>
+          </p:cNvSpPr>
+          <p:nvPr>
+            <p:ph type="sldNum" sz="quarter" idx="5"/>
+          </p:nvPr>
+        </p:nvSpPr>
+        <p:spPr/>
+        <p:txBody>
+          <a:bodyPr/>
+          <a:lstStyle/>
+          <a:p>
+            <a:fld id="{6A1526D7-69B8-44F2-AC87-DA314CEC5021}" type="slidenum">
+              <a:rPr lang="en-AU" smtClean="0"/>
+              <a:t>13</a:t>
+            </a:fld>
+            <a:endParaRPr lang="en-AU"/>
+          </a:p>
+        </p:txBody>
+      </p:sp>
+    </p:spTree>
+    <p:extLst>
+      <p:ext uri="{BB962C8B-B14F-4D97-AF65-F5344CB8AC3E}">
+        <p14:creationId xmlns:p14="http://schemas.microsoft.com/office/powerpoint/2010/main" val="3191995124"/>
+      </p:ext>
+    </p:extLst>
+  </p:cSld>
+  <p:clrMapOvr>
+    <a:masterClrMapping/>
+  </p:clrMapOvr>
+</p:notes>
+</file>
+
 <file path=ppt/notesSlides/notesSlide2.xml><?xml version="1.0" encoding="utf-8"?>
 <p:notes xmlns:a="http://schemas.openxmlformats.org/drawingml/2006/main" xmlns:r="http://schemas.openxmlformats.org/officeDocument/2006/relationships" xmlns:p="http://schemas.openxmlformats.org/presentationml/2006/main">
   <p:cSld>
@@ -4159,7 +4244,68 @@
                 <a:effectLst/>
                 <a:latin typeface="Consolas" panose="020B0609020204030204" pitchFamily="49" charset="0"/>
               </a:rPr>
-              <a:t>Looking through the information that has been retained, we can make the following observations.</a:t>
+              <a:t>The bedrooms, bathrooms, garage wand </a:t>
+            </a:r>
+            <a:r>
+              <a:rPr lang="en-US" b="0" dirty="0" err="1">
+                <a:solidFill>
+                  <a:srgbClr val="CCCCCC"/>
+                </a:solidFill>
+                <a:effectLst/>
+                <a:latin typeface="Consolas" panose="020B0609020204030204" pitchFamily="49" charset="0"/>
+              </a:rPr>
+              <a:t>floor_area</a:t>
+            </a:r>
+            <a:r>
+              <a:rPr lang="en-US" b="0" dirty="0">
+                <a:solidFill>
+                  <a:srgbClr val="CCCCCC"/>
+                </a:solidFill>
+                <a:effectLst/>
+                <a:latin typeface="Consolas" panose="020B0609020204030204" pitchFamily="49" charset="0"/>
+              </a:rPr>
+              <a:t> columns were all cleaned and any outliers were updated to represent the median value for each column. Floor Area was updated to represent the 25</a:t>
+            </a:r>
+            <a:r>
+              <a:rPr lang="en-US" b="0" baseline="30000" dirty="0">
+                <a:solidFill>
+                  <a:srgbClr val="CCCCCC"/>
+                </a:solidFill>
+                <a:effectLst/>
+                <a:latin typeface="Consolas" panose="020B0609020204030204" pitchFamily="49" charset="0"/>
+              </a:rPr>
+              <a:t>th</a:t>
+            </a:r>
+            <a:r>
+              <a:rPr lang="en-US" b="0" dirty="0">
+                <a:solidFill>
+                  <a:srgbClr val="CCCCCC"/>
+                </a:solidFill>
+                <a:effectLst/>
+                <a:latin typeface="Consolas" panose="020B0609020204030204" pitchFamily="49" charset="0"/>
+              </a:rPr>
+              <a:t> percentile as I believe this would be a better representation of the Floor Area data.</a:t>
+            </a:r>
+          </a:p>
+          <a:p>
+            <a:endParaRPr lang="en-US" b="0" dirty="0">
+              <a:solidFill>
+                <a:srgbClr val="CCCCCC"/>
+              </a:solidFill>
+              <a:effectLst/>
+              <a:latin typeface="Consolas" panose="020B0609020204030204" pitchFamily="49" charset="0"/>
+            </a:endParaRPr>
+          </a:p>
+          <a:p>
+            <a:r>
+              <a:rPr lang="en-US" b="0" dirty="0">
+                <a:solidFill>
+                  <a:srgbClr val="CCCCCC"/>
+                </a:solidFill>
+                <a:effectLst/>
+                <a:latin typeface="Consolas" panose="020B0609020204030204" pitchFamily="49" charset="0"/>
+              </a:rPr>
+              <a:t>Looking through the information, we can make the following observations.</a:t>
             </a:r>
           </a:p>
           <a:p>
@@ -4190,7 +4336,7 @@
                 <a:effectLst/>
                 <a:latin typeface="Consolas" panose="020B0609020204030204" pitchFamily="49" charset="0"/>
               </a:rPr>
-              <a:t> A typical Perth house has 2 bathrooms, 3-4 bedrooms, is built after 1975 with a floor area of around 200sqm, a double garage and is close to schools.</a:t>
+              <a:t> A typical Perth house has 2 bathrooms, 4 bedrooms, is built after 1975 with a floor area of around 200sqm, a double garage and is close to schools.</a:t>
             </a:r>
           </a:p>
           <a:p>
@@ -4221,7 +4367,7 @@
                 <a:effectLst/>
                 <a:latin typeface="Consolas" panose="020B0609020204030204" pitchFamily="49" charset="0"/>
               </a:rPr>
-              <a:t> A house is sold around the $500,000 mark and most likely to be sold in the summer months.</a:t>
+              <a:t> A house is sold around the $500,000 mark and most likely to be sold in the summer months (December and January specifically).</a:t>
             </a:r>
           </a:p>
           <a:p>
@@ -4340,65 +4486,29 @@
           <a:bodyPr/>
           <a:lstStyle/>
           <a:p>
+            <a:pPr marL="0" marR="0" lvl="0" indent="0" algn="l" defTabSz="914400" rtl="0" eaLnBrk="1" fontAlgn="auto" latinLnBrk="0" hangingPunct="1">
+              <a:lnSpc>
+                <a:spcPct val="100000"/>
+              </a:lnSpc>
+              <a:spcBef>
+                <a:spcPts val="0"/>
+              </a:spcBef>
+              <a:spcAft>
+                <a:spcPts val="0"/>
+              </a:spcAft>
+              <a:buClrTx/>
+              <a:buSzTx/>
+              <a:buFontTx/>
+              <a:buNone/>
+              <a:tabLst/>
+              <a:defRPr/>
+            </a:pPr>
             <a:r>
-              <a:rPr lang="en-AU" dirty="0"/>
-              <a:t>When it had come time to decide what model to use for the machine learning I looked back through class notes and decided to go with the Logistic Regression model, however this one did not work very well. It was taking up to 20-25 minutes to run and my scores were rock bottom. I did some research and realised I had chosen poorly, and that Linear Regression was the best suited model to the data set that I was using. Once I made these changes the model ran much better and was able to achieve a good result. </a:t>
+              <a:rPr lang="en-US" dirty="0"/>
+              <a:t>Get_dummies was used to transform these categorical variables into a format suitable for the Machine Learning models which would then produce better performance by the models.</a:t>
             </a:r>
           </a:p>
           <a:p>
-            <a:endParaRPr lang="en-AU" dirty="0"/>
-          </a:p>
-          <a:p>
-            <a:r>
-              <a:rPr lang="en-AU" dirty="0"/>
-              <a:t>I wanted to try at running a second model to see if I could achieve a greater score than I had with the Linear Regression?  I once again chose poorly and went with the Decision Tree Classifier. When it came to creating a confusion matrix I continually was given error after error no matter what I tried.  Through discussion with my instructor, it was decided to try an alternate model.</a:t>
-            </a:r>
-          </a:p>
-          <a:p>
-            <a:endParaRPr lang="en-AU" dirty="0"/>
-          </a:p>
-          <a:p>
-            <a:r>
-              <a:rPr lang="en-AU" dirty="0"/>
-              <a:t>This time I decided to work on a Random Forest Classifier model. Initially I was running with high parameters and reduced these to a lower value. When running the predict model I was getting an error and after some investigation it was discovered that I was running a classifier model and not a regression model, so once I made the changes and ran it as a Deep Forest Regressor Model everything worked and I was able to get a result.</a:t>
-            </a:r>
-          </a:p>
-          <a:p>
-            <a:endParaRPr lang="en-AU" dirty="0"/>
-          </a:p>
-          <a:p>
-            <a:r>
-              <a:rPr lang="en-AU" dirty="0"/>
-              <a:t>It was then that I realised that I had also been running my Decision tree model as a classifier and not as a regressor model. </a:t>
-            </a:r>
-          </a:p>
-          <a:p>
-            <a:endParaRPr lang="en-AU" dirty="0"/>
-          </a:p>
-          <a:p>
-            <a:r>
-              <a:rPr lang="en-AU" dirty="0"/>
-              <a:t>So initially I had planned on running two models and ended up running 3.</a:t>
-            </a:r>
-          </a:p>
-          <a:p>
-            <a:endParaRPr lang="en-AU" dirty="0"/>
-          </a:p>
-          <a:p>
-            <a:r>
-              <a:rPr lang="en-AU" dirty="0"/>
-              <a:t>I ran the StandardScaler For both the Decision Tree and Random Forest models to </a:t>
-            </a:r>
-            <a:r>
-              <a:rPr lang="en-US" b="0" i="0" dirty="0">
-                <a:solidFill>
-                  <a:srgbClr val="D1D5DB"/>
-                </a:solidFill>
-                <a:effectLst/>
-                <a:latin typeface="Söhne"/>
-              </a:rPr>
-              <a:t>standardize the features within the dataframe to help achieve more consistent scales across different features of the data set.</a:t>
-            </a:r>
             <a:endParaRPr lang="en-AU" dirty="0"/>
           </a:p>
         </p:txBody>
@@ -4420,7 +4530,7 @@
           <a:p>
             <a:fld id="{6A1526D7-69B8-44F2-AC87-DA314CEC5021}" type="slidenum">
               <a:rPr lang="en-AU" smtClean="0"/>
-              <a:t>7</a:t>
+              <a:t>6</a:t>
             </a:fld>
             <a:endParaRPr lang="en-AU"/>
           </a:p>
@@ -4429,7 +4539,7 @@
     </p:spTree>
     <p:extLst>
       <p:ext uri="{BB962C8B-B14F-4D97-AF65-F5344CB8AC3E}">
-        <p14:creationId xmlns:p14="http://schemas.microsoft.com/office/powerpoint/2010/main" val="2189194673"/>
+        <p14:creationId xmlns:p14="http://schemas.microsoft.com/office/powerpoint/2010/main" val="2889690774"/>
       </p:ext>
     </p:extLst>
   </p:cSld>
@@ -4485,13 +4595,53 @@
           <a:p>
             <a:r>
               <a:rPr lang="en-AU" dirty="0"/>
-              <a:t>Here we can see the results.</a:t>
+              <a:t>When it had come time to decide what model to use for the machine learning I looked back through class notes and decided to go with the Logistic Regression model, however this one did not work very well. It was taking up to 20-25 minutes to run and my scores were rock bottom. I did some research and realised I had chosen poorly, and that Linear Regression was the best suited model to the data set that I was using. Once I made these changes the model ran much better and was able to achieve a good result. </a:t>
             </a:r>
           </a:p>
           <a:p>
             <a:endParaRPr lang="en-AU" dirty="0"/>
           </a:p>
           <a:p>
+            <a:r>
+              <a:rPr lang="en-AU" dirty="0"/>
+              <a:t>I wanted to try at running a second model to see if I could achieve a greater score than I had with the Linear Regression?  I once again chose poorly and went with the Decision Tree Classifier. When it came to creating a confusion matrix I continually was given error after error no matter what I tried.  Through discussion with my instructor, it was decided to try an alternate model.</a:t>
+            </a:r>
+          </a:p>
+          <a:p>
+            <a:endParaRPr lang="en-AU" dirty="0"/>
+          </a:p>
+          <a:p>
+            <a:r>
+              <a:rPr lang="en-AU" dirty="0"/>
+              <a:t>This time I decided to work on a Random Forest Classifier model. Initially I was running with high parameters and reduced these to a lower value. When running the predict model I was getting an error and after some investigation it was discovered that I was running a classifier model and not a regression model, so once I made the changes and ran it as a Deep Forest Regressor Model everything worked and I was able to get a result.</a:t>
+            </a:r>
+          </a:p>
+          <a:p>
+            <a:endParaRPr lang="en-AU" dirty="0"/>
+          </a:p>
+          <a:p>
+            <a:r>
+              <a:rPr lang="en-AU" dirty="0"/>
+              <a:t>It was then that I realised that I had also been running my Decision tree model as a classifier and not as a regressor model. </a:t>
+            </a:r>
+          </a:p>
+          <a:p>
+            <a:endParaRPr lang="en-AU" dirty="0"/>
+          </a:p>
+          <a:p>
+            <a:r>
+              <a:rPr lang="en-AU" dirty="0"/>
+              <a:t>So initially I had planned on running two models and ended up running 3.</a:t>
+            </a:r>
+          </a:p>
+          <a:p>
+            <a:endParaRPr lang="en-AU" dirty="0"/>
+          </a:p>
+          <a:p>
+            <a:r>
+              <a:rPr lang="en-AU" dirty="0"/>
+              <a:t>I ran the StandardScaler For both the Decision Tree and Random Forest models to </a:t>
+            </a:r>
             <a:r>
               <a:rPr lang="en-US" b="0" i="0" dirty="0">
                 <a:solidFill>
@@ -4500,70 +4650,7 @@
                 <a:effectLst/>
                 <a:latin typeface="Söhne"/>
               </a:rPr>
-              <a:t>The linear regression model has the highest score/R2 value, which indicates a better fit to the data and better performance in explaining the variability of the target variable. </a:t>
-            </a:r>
-          </a:p>
-          <a:p>
-            <a:endParaRPr lang="en-US" b="0" i="0" dirty="0">
-              <a:solidFill>
-                <a:srgbClr val="D1D5DB"/>
-              </a:solidFill>
-              <a:effectLst/>
-              <a:latin typeface="Söhne"/>
-            </a:endParaRPr>
-          </a:p>
-          <a:p>
-            <a:r>
-              <a:rPr lang="en-US" b="0" i="0" dirty="0">
-                <a:solidFill>
-                  <a:srgbClr val="D1D5DB"/>
-                </a:solidFill>
-                <a:effectLst/>
-                <a:latin typeface="Söhne"/>
-              </a:rPr>
-              <a:t>The linear regression model has the lowest MSE, indicating smaller errors in predicting the target variable compared to the other two models. </a:t>
-            </a:r>
-          </a:p>
-          <a:p>
-            <a:endParaRPr lang="en-US" b="0" i="0" dirty="0">
-              <a:solidFill>
-                <a:srgbClr val="D1D5DB"/>
-              </a:solidFill>
-              <a:effectLst/>
-              <a:latin typeface="Söhne"/>
-            </a:endParaRPr>
-          </a:p>
-          <a:p>
-            <a:r>
-              <a:rPr lang="en-US" b="0" i="0" dirty="0">
-                <a:solidFill>
-                  <a:srgbClr val="D1D5DB"/>
-                </a:solidFill>
-                <a:effectLst/>
-                <a:latin typeface="Söhne"/>
-              </a:rPr>
-              <a:t>Similar to the MSE results, the linear regression model has the lowest RMSE value, indicating smaller average errors in prediction. </a:t>
-            </a:r>
-          </a:p>
-          <a:p>
-            <a:endParaRPr lang="en-US" b="0" i="0" dirty="0">
-              <a:solidFill>
-                <a:srgbClr val="D1D5DB"/>
-              </a:solidFill>
-              <a:effectLst/>
-              <a:latin typeface="Söhne"/>
-            </a:endParaRPr>
-          </a:p>
-          <a:p>
-            <a:r>
-              <a:rPr lang="en-US" b="0" i="0" dirty="0">
-                <a:solidFill>
-                  <a:srgbClr val="D1D5DB"/>
-                </a:solidFill>
-                <a:effectLst/>
-                <a:latin typeface="Söhne"/>
-              </a:rPr>
-              <a:t>The standard deviation value appears to be the same for all three models. </a:t>
+              <a:t>standardize the features within the dataframe to help achieve more consistent scales across different features of the data set.</a:t>
             </a:r>
             <a:endParaRPr lang="en-AU" dirty="0"/>
           </a:p>
@@ -4586,7 +4673,7 @@
           <a:p>
             <a:fld id="{6A1526D7-69B8-44F2-AC87-DA314CEC5021}" type="slidenum">
               <a:rPr lang="en-AU" smtClean="0"/>
-              <a:t>8</a:t>
+              <a:t>7</a:t>
             </a:fld>
             <a:endParaRPr lang="en-AU"/>
           </a:p>
@@ -4595,7 +4682,7 @@
     </p:spTree>
     <p:extLst>
       <p:ext uri="{BB962C8B-B14F-4D97-AF65-F5344CB8AC3E}">
-        <p14:creationId xmlns:p14="http://schemas.microsoft.com/office/powerpoint/2010/main" val="2777383789"/>
+        <p14:creationId xmlns:p14="http://schemas.microsoft.com/office/powerpoint/2010/main" val="2189194673"/>
       </p:ext>
     </p:extLst>
   </p:cSld>
@@ -4650,6 +4737,172 @@
           <a:lstStyle/>
           <a:p>
             <a:r>
+              <a:rPr lang="en-AU" dirty="0"/>
+              <a:t>Here we can see the results.</a:t>
+            </a:r>
+          </a:p>
+          <a:p>
+            <a:endParaRPr lang="en-AU" dirty="0"/>
+          </a:p>
+          <a:p>
+            <a:r>
+              <a:rPr lang="en-US" b="0" i="0" dirty="0">
+                <a:solidFill>
+                  <a:srgbClr val="D1D5DB"/>
+                </a:solidFill>
+                <a:effectLst/>
+                <a:latin typeface="Söhne"/>
+              </a:rPr>
+              <a:t>The linear regression model has the highest score/R2 value, which indicates a better fit to the data and better performance in explaining the variability of the target variable. </a:t>
+            </a:r>
+          </a:p>
+          <a:p>
+            <a:endParaRPr lang="en-US" b="0" i="0" dirty="0">
+              <a:solidFill>
+                <a:srgbClr val="D1D5DB"/>
+              </a:solidFill>
+              <a:effectLst/>
+              <a:latin typeface="Söhne"/>
+            </a:endParaRPr>
+          </a:p>
+          <a:p>
+            <a:r>
+              <a:rPr lang="en-US" b="0" i="0" dirty="0">
+                <a:solidFill>
+                  <a:srgbClr val="D1D5DB"/>
+                </a:solidFill>
+                <a:effectLst/>
+                <a:latin typeface="Söhne"/>
+              </a:rPr>
+              <a:t>The linear regression model has the lowest MSE, (Mean Squared Error) indicating smaller errors in predicting the target variable compared to the other two models. </a:t>
+            </a:r>
+          </a:p>
+          <a:p>
+            <a:endParaRPr lang="en-US" b="0" i="0" dirty="0">
+              <a:solidFill>
+                <a:srgbClr val="D1D5DB"/>
+              </a:solidFill>
+              <a:effectLst/>
+              <a:latin typeface="Söhne"/>
+            </a:endParaRPr>
+          </a:p>
+          <a:p>
+            <a:r>
+              <a:rPr lang="en-US" b="0" i="0" dirty="0">
+                <a:solidFill>
+                  <a:srgbClr val="D1D5DB"/>
+                </a:solidFill>
+                <a:effectLst/>
+                <a:latin typeface="Söhne"/>
+              </a:rPr>
+              <a:t>Like the MSE results, the linear regression model has the lowest RMSE (Root Mean Squared Error) value, indicating smaller average errors in prediction. </a:t>
+            </a:r>
+          </a:p>
+          <a:p>
+            <a:endParaRPr lang="en-US" b="0" i="0" dirty="0">
+              <a:solidFill>
+                <a:srgbClr val="D1D5DB"/>
+              </a:solidFill>
+              <a:effectLst/>
+              <a:latin typeface="Söhne"/>
+            </a:endParaRPr>
+          </a:p>
+          <a:p>
+            <a:r>
+              <a:rPr lang="en-US" b="0" i="0" dirty="0">
+                <a:solidFill>
+                  <a:srgbClr val="D1D5DB"/>
+                </a:solidFill>
+                <a:effectLst/>
+                <a:latin typeface="Söhne"/>
+              </a:rPr>
+              <a:t>The standard deviation value is the same for all three models. </a:t>
+            </a:r>
+            <a:endParaRPr lang="en-AU" dirty="0"/>
+          </a:p>
+        </p:txBody>
+      </p:sp>
+      <p:sp>
+        <p:nvSpPr>
+          <p:cNvPr id="4" name="Slide Number Placeholder 3"/>
+          <p:cNvSpPr>
+            <a:spLocks noGrp="1"/>
+          </p:cNvSpPr>
+          <p:nvPr>
+            <p:ph type="sldNum" sz="quarter" idx="5"/>
+          </p:nvPr>
+        </p:nvSpPr>
+        <p:spPr/>
+        <p:txBody>
+          <a:bodyPr/>
+          <a:lstStyle/>
+          <a:p>
+            <a:fld id="{6A1526D7-69B8-44F2-AC87-DA314CEC5021}" type="slidenum">
+              <a:rPr lang="en-AU" smtClean="0"/>
+              <a:t>8</a:t>
+            </a:fld>
+            <a:endParaRPr lang="en-AU"/>
+          </a:p>
+        </p:txBody>
+      </p:sp>
+    </p:spTree>
+    <p:extLst>
+      <p:ext uri="{BB962C8B-B14F-4D97-AF65-F5344CB8AC3E}">
+        <p14:creationId xmlns:p14="http://schemas.microsoft.com/office/powerpoint/2010/main" val="2777383789"/>
+      </p:ext>
+    </p:extLst>
+  </p:cSld>
+  <p:clrMapOvr>
+    <a:masterClrMapping/>
+  </p:clrMapOvr>
+</p:notes>
+</file>
+
+<file path=ppt/notesSlides/notesSlide7.xml><?xml version="1.0" encoding="utf-8"?>
+<p:notes xmlns:a="http://schemas.openxmlformats.org/drawingml/2006/main" xmlns:r="http://schemas.openxmlformats.org/officeDocument/2006/relationships" xmlns:p="http://schemas.openxmlformats.org/presentationml/2006/main">
+  <p:cSld>
+    <p:spTree>
+      <p:nvGrpSpPr>
+        <p:cNvPr id="1" name=""/>
+        <p:cNvGrpSpPr/>
+        <p:nvPr/>
+      </p:nvGrpSpPr>
+      <p:grpSpPr>
+        <a:xfrm>
+          <a:off x="0" y="0"/>
+          <a:ext cx="0" cy="0"/>
+          <a:chOff x="0" y="0"/>
+          <a:chExt cx="0" cy="0"/>
+        </a:xfrm>
+      </p:grpSpPr>
+      <p:sp>
+        <p:nvSpPr>
+          <p:cNvPr id="2" name="Slide Image Placeholder 1"/>
+          <p:cNvSpPr>
+            <a:spLocks noGrp="1" noRot="1" noChangeAspect="1"/>
+          </p:cNvSpPr>
+          <p:nvPr>
+            <p:ph type="sldImg"/>
+          </p:nvPr>
+        </p:nvSpPr>
+        <p:spPr/>
+      </p:sp>
+      <p:sp>
+        <p:nvSpPr>
+          <p:cNvPr id="3" name="Notes Placeholder 2"/>
+          <p:cNvSpPr>
+            <a:spLocks noGrp="1"/>
+          </p:cNvSpPr>
+          <p:nvPr>
+            <p:ph type="body" idx="1"/>
+          </p:nvPr>
+        </p:nvSpPr>
+        <p:spPr/>
+        <p:txBody>
+          <a:bodyPr/>
+          <a:lstStyle/>
+          <a:p>
+            <a:r>
               <a:rPr lang="en-US" b="0" dirty="0">
                 <a:solidFill>
                   <a:srgbClr val="CCCCCC"/>
@@ -4657,7 +4910,7 @@
                 <a:effectLst/>
                 <a:latin typeface="Consolas" panose="020B0609020204030204" pitchFamily="49" charset="0"/>
               </a:rPr>
-              <a:t>Of the 3 Regression Models used the Linear Regression Model was the best performer with a score of 77.27%.</a:t>
+              <a:t>Of the 3 Regression Models used the Linear Regression Model was the best performer with a score of 77.30%.</a:t>
             </a:r>
           </a:p>
           <a:p>
@@ -4759,6 +5012,288 @@
     <p:extLst>
       <p:ext uri="{BB962C8B-B14F-4D97-AF65-F5344CB8AC3E}">
         <p14:creationId xmlns:p14="http://schemas.microsoft.com/office/powerpoint/2010/main" val="3397753601"/>
+      </p:ext>
+    </p:extLst>
+  </p:cSld>
+  <p:clrMapOvr>
+    <a:masterClrMapping/>
+  </p:clrMapOvr>
+</p:notes>
+</file>
+
+<file path=ppt/notesSlides/notesSlide8.xml><?xml version="1.0" encoding="utf-8"?>
+<p:notes xmlns:a="http://schemas.openxmlformats.org/drawingml/2006/main" xmlns:r="http://schemas.openxmlformats.org/officeDocument/2006/relationships" xmlns:p="http://schemas.openxmlformats.org/presentationml/2006/main">
+  <p:cSld>
+    <p:spTree>
+      <p:nvGrpSpPr>
+        <p:cNvPr id="1" name=""/>
+        <p:cNvGrpSpPr/>
+        <p:nvPr/>
+      </p:nvGrpSpPr>
+      <p:grpSpPr>
+        <a:xfrm>
+          <a:off x="0" y="0"/>
+          <a:ext cx="0" cy="0"/>
+          <a:chOff x="0" y="0"/>
+          <a:chExt cx="0" cy="0"/>
+        </a:xfrm>
+      </p:grpSpPr>
+      <p:sp>
+        <p:nvSpPr>
+          <p:cNvPr id="2" name="Slide Image Placeholder 1"/>
+          <p:cNvSpPr>
+            <a:spLocks noGrp="1" noRot="1" noChangeAspect="1"/>
+          </p:cNvSpPr>
+          <p:nvPr>
+            <p:ph type="sldImg"/>
+          </p:nvPr>
+        </p:nvSpPr>
+        <p:spPr/>
+      </p:sp>
+      <p:sp>
+        <p:nvSpPr>
+          <p:cNvPr id="3" name="Notes Placeholder 2"/>
+          <p:cNvSpPr>
+            <a:spLocks noGrp="1"/>
+          </p:cNvSpPr>
+          <p:nvPr>
+            <p:ph type="body" idx="1"/>
+          </p:nvPr>
+        </p:nvSpPr>
+        <p:spPr/>
+        <p:txBody>
+          <a:bodyPr/>
+          <a:lstStyle/>
+          <a:p>
+            <a:r>
+              <a:rPr lang="en-AU" dirty="0"/>
+              <a:t>I chose Tableau to be my main visualisation application as this is an area, I would like to focus on in my future Data Analysis career</a:t>
+            </a:r>
+          </a:p>
+        </p:txBody>
+      </p:sp>
+      <p:sp>
+        <p:nvSpPr>
+          <p:cNvPr id="4" name="Slide Number Placeholder 3"/>
+          <p:cNvSpPr>
+            <a:spLocks noGrp="1"/>
+          </p:cNvSpPr>
+          <p:nvPr>
+            <p:ph type="sldNum" sz="quarter" idx="5"/>
+          </p:nvPr>
+        </p:nvSpPr>
+        <p:spPr/>
+        <p:txBody>
+          <a:bodyPr/>
+          <a:lstStyle/>
+          <a:p>
+            <a:fld id="{6A1526D7-69B8-44F2-AC87-DA314CEC5021}" type="slidenum">
+              <a:rPr lang="en-AU" smtClean="0"/>
+              <a:t>10</a:t>
+            </a:fld>
+            <a:endParaRPr lang="en-AU"/>
+          </a:p>
+        </p:txBody>
+      </p:sp>
+    </p:spTree>
+    <p:extLst>
+      <p:ext uri="{BB962C8B-B14F-4D97-AF65-F5344CB8AC3E}">
+        <p14:creationId xmlns:p14="http://schemas.microsoft.com/office/powerpoint/2010/main" val="3019774781"/>
+      </p:ext>
+    </p:extLst>
+  </p:cSld>
+  <p:clrMapOvr>
+    <a:masterClrMapping/>
+  </p:clrMapOvr>
+</p:notes>
+</file>
+
+<file path=ppt/notesSlides/notesSlide9.xml><?xml version="1.0" encoding="utf-8"?>
+<p:notes xmlns:a="http://schemas.openxmlformats.org/drawingml/2006/main" xmlns:r="http://schemas.openxmlformats.org/officeDocument/2006/relationships" xmlns:p="http://schemas.openxmlformats.org/presentationml/2006/main">
+  <p:cSld>
+    <p:spTree>
+      <p:nvGrpSpPr>
+        <p:cNvPr id="1" name=""/>
+        <p:cNvGrpSpPr/>
+        <p:nvPr/>
+      </p:nvGrpSpPr>
+      <p:grpSpPr>
+        <a:xfrm>
+          <a:off x="0" y="0"/>
+          <a:ext cx="0" cy="0"/>
+          <a:chOff x="0" y="0"/>
+          <a:chExt cx="0" cy="0"/>
+        </a:xfrm>
+      </p:grpSpPr>
+      <p:sp>
+        <p:nvSpPr>
+          <p:cNvPr id="2" name="Slide Image Placeholder 1"/>
+          <p:cNvSpPr>
+            <a:spLocks noGrp="1" noRot="1" noChangeAspect="1"/>
+          </p:cNvSpPr>
+          <p:nvPr>
+            <p:ph type="sldImg"/>
+          </p:nvPr>
+        </p:nvSpPr>
+        <p:spPr/>
+      </p:sp>
+      <p:sp>
+        <p:nvSpPr>
+          <p:cNvPr id="3" name="Notes Placeholder 2"/>
+          <p:cNvSpPr>
+            <a:spLocks noGrp="1"/>
+          </p:cNvSpPr>
+          <p:nvPr>
+            <p:ph type="body" idx="1"/>
+          </p:nvPr>
+        </p:nvSpPr>
+        <p:spPr/>
+        <p:txBody>
+          <a:bodyPr/>
+          <a:lstStyle/>
+          <a:p>
+            <a:r>
+              <a:rPr lang="en-AU" dirty="0"/>
+              <a:t>Dalkeith is the top Selling Suburb with an Average Sale Price of $1.9 million.</a:t>
+            </a:r>
+          </a:p>
+          <a:p>
+            <a:endParaRPr lang="en-AU" dirty="0"/>
+          </a:p>
+          <a:p>
+            <a:r>
+              <a:rPr lang="en-AU" dirty="0"/>
+              <a:t>Both Ave Floor Area and Ave Land Area are represented as scatter plots with Average Bedrooms per house shown as a colour filter. </a:t>
+            </a:r>
+          </a:p>
+          <a:p>
+            <a:endParaRPr lang="en-AU" dirty="0"/>
+          </a:p>
+          <a:p>
+            <a:r>
+              <a:rPr lang="en-AU" dirty="0"/>
+              <a:t>Average Floor Area.</a:t>
+            </a:r>
+          </a:p>
+          <a:p>
+            <a:endParaRPr lang="en-AU" dirty="0"/>
+          </a:p>
+          <a:p>
+            <a:r>
+              <a:rPr lang="en-AU" dirty="0"/>
+              <a:t>This shows that as the Average Floor Area of the house gets larger so to do the bedrooms increase in quantity.</a:t>
+            </a:r>
+          </a:p>
+          <a:p>
+            <a:endParaRPr lang="en-AU" dirty="0"/>
+          </a:p>
+          <a:p>
+            <a:r>
+              <a:rPr lang="en-AU" dirty="0"/>
+              <a:t>Naval Base and Wangara both show as outliers on the Average Floor Area chart.</a:t>
+            </a:r>
+          </a:p>
+          <a:p>
+            <a:endParaRPr lang="en-AU" dirty="0"/>
+          </a:p>
+          <a:p>
+            <a:r>
+              <a:rPr lang="en-AU" dirty="0"/>
+              <a:t>Average Floor Area Median is 180.6 m2</a:t>
+            </a:r>
+          </a:p>
+          <a:p>
+            <a:endParaRPr lang="en-AU" dirty="0"/>
+          </a:p>
+          <a:p>
+            <a:r>
+              <a:rPr lang="en-AU" dirty="0"/>
+              <a:t>Average Floor Area Median Sale Price is $578,074</a:t>
+            </a:r>
+          </a:p>
+          <a:p>
+            <a:endParaRPr lang="en-AU" dirty="0"/>
+          </a:p>
+          <a:p>
+            <a:r>
+              <a:rPr lang="en-AU" dirty="0"/>
+              <a:t>Average Land Area Median is 765 m2</a:t>
+            </a:r>
+          </a:p>
+          <a:p>
+            <a:endParaRPr lang="en-AU" dirty="0"/>
+          </a:p>
+          <a:p>
+            <a:r>
+              <a:rPr lang="en-AU" dirty="0"/>
+              <a:t>Average Sale Price by Build Year shows that homes built pre-1946 tend to have a higher sale price than more modern houses. With a peak of house or houses built in 1943 being sold for an average of $1.85 million</a:t>
+            </a:r>
+          </a:p>
+          <a:p>
+            <a:endParaRPr lang="en-AU" dirty="0"/>
+          </a:p>
+          <a:p>
+            <a:r>
+              <a:rPr lang="en-AU" dirty="0"/>
+              <a:t>Average Sale Price by Year Sold show that since 2006 houses are being sold consistently above $600,000.</a:t>
+            </a:r>
+          </a:p>
+          <a:p>
+            <a:endParaRPr lang="en-AU" dirty="0"/>
+          </a:p>
+          <a:p>
+            <a:r>
+              <a:rPr lang="en-AU" dirty="0"/>
+              <a:t>Swan Valley Senior High School and Kiara College had the highest school counts in the data set. While Midland Station was by far the highest station count.</a:t>
+            </a:r>
+          </a:p>
+          <a:p>
+            <a:endParaRPr lang="en-AU" dirty="0"/>
+          </a:p>
+          <a:p>
+            <a:endParaRPr lang="en-AU" dirty="0"/>
+          </a:p>
+          <a:p>
+            <a:endParaRPr lang="en-AU" dirty="0"/>
+          </a:p>
+          <a:p>
+            <a:endParaRPr lang="en-AU" dirty="0"/>
+          </a:p>
+          <a:p>
+            <a:endParaRPr lang="en-AU" dirty="0"/>
+          </a:p>
+          <a:p>
+            <a:endParaRPr lang="en-AU" dirty="0"/>
+          </a:p>
+        </p:txBody>
+      </p:sp>
+      <p:sp>
+        <p:nvSpPr>
+          <p:cNvPr id="4" name="Slide Number Placeholder 3"/>
+          <p:cNvSpPr>
+            <a:spLocks noGrp="1"/>
+          </p:cNvSpPr>
+          <p:nvPr>
+            <p:ph type="sldNum" sz="quarter" idx="5"/>
+          </p:nvPr>
+        </p:nvSpPr>
+        <p:spPr/>
+        <p:txBody>
+          <a:bodyPr/>
+          <a:lstStyle/>
+          <a:p>
+            <a:fld id="{6A1526D7-69B8-44F2-AC87-DA314CEC5021}" type="slidenum">
+              <a:rPr lang="en-AU" smtClean="0"/>
+              <a:t>12</a:t>
+            </a:fld>
+            <a:endParaRPr lang="en-AU"/>
+          </a:p>
+        </p:txBody>
+      </p:sp>
+    </p:spTree>
+    <p:extLst>
+      <p:ext uri="{BB962C8B-B14F-4D97-AF65-F5344CB8AC3E}">
+        <p14:creationId xmlns:p14="http://schemas.microsoft.com/office/powerpoint/2010/main" val="1539306250"/>
       </p:ext>
     </p:extLst>
   </p:cSld>
@@ -4907,7 +5442,7 @@
           <a:p>
             <a:fld id="{48A87A34-81AB-432B-8DAE-1953F412C126}" type="datetimeFigureOut">
               <a:rPr lang="en-US" dirty="0"/>
-              <a:t>5/29/2023</a:t>
+              <a:t>5/30/2023</a:t>
             </a:fld>
             <a:endParaRPr lang="en-US" dirty="0"/>
           </a:p>
@@ -5113,7 +5648,7 @@
           <a:p>
             <a:fld id="{48A87A34-81AB-432B-8DAE-1953F412C126}" type="datetimeFigureOut">
               <a:rPr lang="en-US" dirty="0"/>
-              <a:t>5/29/2023</a:t>
+              <a:t>5/30/2023</a:t>
             </a:fld>
             <a:endParaRPr lang="en-US" dirty="0"/>
           </a:p>
@@ -5323,7 +5858,7 @@
           <a:p>
             <a:fld id="{48A87A34-81AB-432B-8DAE-1953F412C126}" type="datetimeFigureOut">
               <a:rPr lang="en-US" dirty="0"/>
-              <a:t>5/29/2023</a:t>
+              <a:t>5/30/2023</a:t>
             </a:fld>
             <a:endParaRPr lang="en-US" dirty="0"/>
           </a:p>
@@ -5519,7 +6054,7 @@
           <a:p>
             <a:fld id="{48A87A34-81AB-432B-8DAE-1953F412C126}" type="datetimeFigureOut">
               <a:rPr lang="en-US" dirty="0"/>
-              <a:t>5/29/2023</a:t>
+              <a:t>5/30/2023</a:t>
             </a:fld>
             <a:endParaRPr lang="en-US" dirty="0"/>
           </a:p>
@@ -5793,7 +6328,7 @@
           <a:p>
             <a:fld id="{48A87A34-81AB-432B-8DAE-1953F412C126}" type="datetimeFigureOut">
               <a:rPr lang="en-US" dirty="0"/>
-              <a:t>5/29/2023</a:t>
+              <a:t>5/30/2023</a:t>
             </a:fld>
             <a:endParaRPr lang="en-US" dirty="0"/>
           </a:p>
@@ -6056,7 +6591,7 @@
           <a:p>
             <a:fld id="{48A87A34-81AB-432B-8DAE-1953F412C126}" type="datetimeFigureOut">
               <a:rPr lang="en-US" dirty="0"/>
-              <a:t>5/29/2023</a:t>
+              <a:t>5/30/2023</a:t>
             </a:fld>
             <a:endParaRPr lang="en-US" dirty="0"/>
           </a:p>
@@ -6467,7 +7002,7 @@
           <a:p>
             <a:fld id="{48A87A34-81AB-432B-8DAE-1953F412C126}" type="datetimeFigureOut">
               <a:rPr lang="en-US" dirty="0"/>
-              <a:t>5/29/2023</a:t>
+              <a:t>5/30/2023</a:t>
             </a:fld>
             <a:endParaRPr lang="en-US" dirty="0"/>
           </a:p>
@@ -6611,7 +7146,7 @@
           <a:p>
             <a:fld id="{48A87A34-81AB-432B-8DAE-1953F412C126}" type="datetimeFigureOut">
               <a:rPr lang="en-US" dirty="0"/>
-              <a:t>5/29/2023</a:t>
+              <a:t>5/30/2023</a:t>
             </a:fld>
             <a:endParaRPr lang="en-US" dirty="0"/>
           </a:p>
@@ -6732,7 +7267,7 @@
           <a:p>
             <a:fld id="{48A87A34-81AB-432B-8DAE-1953F412C126}" type="datetimeFigureOut">
               <a:rPr lang="en-US" dirty="0"/>
-              <a:t>5/29/2023</a:t>
+              <a:t>5/30/2023</a:t>
             </a:fld>
             <a:endParaRPr lang="en-US" dirty="0"/>
           </a:p>
@@ -6978,7 +7513,7 @@
           <a:p>
             <a:fld id="{48A87A34-81AB-432B-8DAE-1953F412C126}" type="datetimeFigureOut">
               <a:rPr lang="en-US" dirty="0"/>
-              <a:t>5/29/2023</a:t>
+              <a:t>5/30/2023</a:t>
             </a:fld>
             <a:endParaRPr lang="en-US" dirty="0"/>
           </a:p>
@@ -7419,7 +7954,7 @@
             <a:fld id="{48A87A34-81AB-432B-8DAE-1953F412C126}" type="datetimeFigureOut">
               <a:rPr lang="en-US" dirty="0"/>
               <a:pPr/>
-              <a:t>5/29/2023</a:t>
+              <a:t>5/30/2023</a:t>
             </a:fld>
             <a:endParaRPr lang="en-US" dirty="0"/>
           </a:p>
@@ -7742,7 +8277,7 @@
             <a:fld id="{48A87A34-81AB-432B-8DAE-1953F412C126}" type="datetimeFigureOut">
               <a:rPr lang="en-US" dirty="0"/>
               <a:pPr/>
-              <a:t>5/29/2023</a:t>
+              <a:t>5/30/2023</a:t>
             </a:fld>
             <a:endParaRPr lang="en-US" dirty="0"/>
           </a:p>
@@ -8979,6 +9514,14 @@
 <file path=ppt/slides/slide10.xml><?xml version="1.0" encoding="utf-8"?>
 <p:sld xmlns:a="http://schemas.openxmlformats.org/drawingml/2006/main" xmlns:r="http://schemas.openxmlformats.org/officeDocument/2006/relationships" xmlns:p="http://schemas.openxmlformats.org/presentationml/2006/main">
   <p:cSld>
+    <p:bg>
+      <p:bgPr>
+        <a:solidFill>
+          <a:schemeClr val="bg2"/>
+        </a:solidFill>
+        <a:effectLst/>
+      </p:bgPr>
+    </p:bg>
     <p:spTree>
       <p:nvGrpSpPr>
         <p:cNvPr id="1" name=""/>
@@ -8995,6 +9538,352 @@
       </p:grpSpPr>
       <p:sp>
         <p:nvSpPr>
+          <p:cNvPr id="7" name="Rectangle 6">
+            <a:extLst>
+              <a:ext uri="{FF2B5EF4-FFF2-40B4-BE49-F238E27FC236}">
+                <a16:creationId xmlns:a16="http://schemas.microsoft.com/office/drawing/2014/main" id="{23522FE7-5A29-4EF6-B1EF-2CA55748A772}"/>
+              </a:ext>
+              <a:ext uri="{C183D7F6-B498-43B3-948B-1728B52AA6E4}">
+                <adec:decorative xmlns:adec="http://schemas.microsoft.com/office/drawing/2017/decorative" val="1"/>
+              </a:ext>
+            </a:extLst>
+          </p:cNvPr>
+          <p:cNvSpPr>
+            <a:spLocks noGrp="1" noRot="1" noChangeAspect="1" noMove="1" noResize="1" noEditPoints="1" noAdjustHandles="1" noChangeArrowheads="1" noChangeShapeType="1" noTextEdit="1"/>
+          </p:cNvSpPr>
+          <p:nvPr>
+            <p:extLst>
+              <p:ext uri="{386F3935-93C4-4BCD-93E2-E3B085C9AB24}">
+                <p16:designElem xmlns:p16="http://schemas.microsoft.com/office/powerpoint/2015/main" val="1"/>
+              </p:ext>
+            </p:extLst>
+          </p:nvPr>
+        </p:nvSpPr>
+        <p:spPr>
+          <a:xfrm>
+            <a:off x="0" y="2019476"/>
+            <a:ext cx="12192000" cy="4105941"/>
+          </a:xfrm>
+          <a:prstGeom prst="rect">
+            <a:avLst/>
+          </a:prstGeom>
+          <a:gradFill flip="none" rotWithShape="1">
+            <a:gsLst>
+              <a:gs pos="0">
+                <a:schemeClr val="bg2">
+                  <a:alpha val="0"/>
+                </a:schemeClr>
+              </a:gs>
+              <a:gs pos="100000">
+                <a:schemeClr val="bg2"/>
+              </a:gs>
+            </a:gsLst>
+            <a:lin ang="5400000" scaled="0"/>
+            <a:tileRect/>
+          </a:gradFill>
+          <a:ln>
+            <a:noFill/>
+          </a:ln>
+        </p:spPr>
+        <p:style>
+          <a:lnRef idx="2">
+            <a:schemeClr val="accent1">
+              <a:shade val="50000"/>
+            </a:schemeClr>
+          </a:lnRef>
+          <a:fillRef idx="1">
+            <a:schemeClr val="accent1"/>
+          </a:fillRef>
+          <a:effectRef idx="0">
+            <a:schemeClr val="accent1"/>
+          </a:effectRef>
+          <a:fontRef idx="minor">
+            <a:schemeClr val="lt1"/>
+          </a:fontRef>
+        </p:style>
+      </p:sp>
+      <p:pic>
+        <p:nvPicPr>
+          <p:cNvPr id="9" name="Picture 8">
+            <a:extLst>
+              <a:ext uri="{FF2B5EF4-FFF2-40B4-BE49-F238E27FC236}">
+                <a16:creationId xmlns:a16="http://schemas.microsoft.com/office/drawing/2014/main" id="{C2192E09-EBC7-416C-B887-DFF915D7F43D}"/>
+              </a:ext>
+              <a:ext uri="{C183D7F6-B498-43B3-948B-1728B52AA6E4}">
+                <adec:decorative xmlns:adec="http://schemas.microsoft.com/office/drawing/2017/decorative" val="1"/>
+              </a:ext>
+            </a:extLst>
+          </p:cNvPr>
+          <p:cNvPicPr>
+            <a:picLocks noGrp="1" noRot="1" noChangeAspect="1" noMove="1" noResize="1" noEditPoints="1" noAdjustHandles="1" noChangeArrowheads="1" noChangeShapeType="1" noCrop="1"/>
+          </p:cNvPicPr>
+          <p:nvPr>
+            <p:extLst>
+              <p:ext uri="{386F3935-93C4-4BCD-93E2-E3B085C9AB24}">
+                <p16:designElem xmlns:p16="http://schemas.microsoft.com/office/powerpoint/2015/main" val="1"/>
+              </p:ext>
+            </p:extLst>
+          </p:nvPr>
+        </p:nvPicPr>
+        <p:blipFill rotWithShape="1">
+          <a:blip r:embed="rId3">
+            <a:extLst>
+              <a:ext uri="{28A0092B-C50C-407E-A947-70E740481C1C}">
+                <a14:useLocalDpi xmlns:a14="http://schemas.microsoft.com/office/drawing/2010/main" val="0"/>
+              </a:ext>
+            </a:extLst>
+          </a:blip>
+          <a:srcRect t="1538" b="-1538"/>
+          <a:stretch/>
+        </p:blipFill>
+        <p:spPr bwMode="black">
+          <a:xfrm>
+            <a:off x="0" y="6126480"/>
+            <a:ext cx="12192000" cy="742950"/>
+          </a:xfrm>
+          <a:prstGeom prst="rect">
+            <a:avLst/>
+          </a:prstGeom>
+        </p:spPr>
+      </p:pic>
+      <p:cxnSp>
+        <p:nvCxnSpPr>
+          <p:cNvPr id="11" name="Straight Connector 10">
+            <a:extLst>
+              <a:ext uri="{FF2B5EF4-FFF2-40B4-BE49-F238E27FC236}">
+                <a16:creationId xmlns:a16="http://schemas.microsoft.com/office/drawing/2014/main" id="{2924498D-E084-44BE-A196-CFCE35564350}"/>
+              </a:ext>
+              <a:ext uri="{C183D7F6-B498-43B3-948B-1728B52AA6E4}">
+                <adec:decorative xmlns:adec="http://schemas.microsoft.com/office/drawing/2017/decorative" val="1"/>
+              </a:ext>
+            </a:extLst>
+          </p:cNvPr>
+          <p:cNvCxnSpPr>
+            <a:cxnSpLocks noGrp="1" noRot="1" noChangeAspect="1" noMove="1" noResize="1" noEditPoints="1" noAdjustHandles="1" noChangeArrowheads="1" noChangeShapeType="1"/>
+          </p:cNvCxnSpPr>
+          <p:nvPr>
+            <p:extLst>
+              <p:ext uri="{386F3935-93C4-4BCD-93E2-E3B085C9AB24}">
+                <p16:designElem xmlns:p16="http://schemas.microsoft.com/office/powerpoint/2015/main" val="1"/>
+              </p:ext>
+            </p:extLst>
+          </p:nvPr>
+        </p:nvCxnSpPr>
+        <p:spPr>
+          <a:xfrm>
+            <a:off x="0" y="6128413"/>
+            <a:ext cx="12192000" cy="0"/>
+          </a:xfrm>
+          <a:prstGeom prst="line">
+            <a:avLst/>
+          </a:prstGeom>
+          <a:ln w="12700">
+            <a:solidFill>
+              <a:srgbClr val="000001">
+                <a:alpha val="20000"/>
+              </a:srgbClr>
+            </a:solidFill>
+          </a:ln>
+        </p:spPr>
+        <p:style>
+          <a:lnRef idx="1">
+            <a:schemeClr val="accent1"/>
+          </a:lnRef>
+          <a:fillRef idx="0">
+            <a:schemeClr val="accent1"/>
+          </a:fillRef>
+          <a:effectRef idx="0">
+            <a:schemeClr val="accent1"/>
+          </a:effectRef>
+          <a:fontRef idx="minor">
+            <a:schemeClr val="tx1"/>
+          </a:fontRef>
+        </p:style>
+      </p:cxnSp>
+      <p:cxnSp>
+        <p:nvCxnSpPr>
+          <p:cNvPr id="13" name="Straight Connector 12">
+            <a:extLst>
+              <a:ext uri="{FF2B5EF4-FFF2-40B4-BE49-F238E27FC236}">
+                <a16:creationId xmlns:a16="http://schemas.microsoft.com/office/drawing/2014/main" id="{3BBC7667-C352-4842-9AFD-E5C16AD002F4}"/>
+              </a:ext>
+              <a:ext uri="{C183D7F6-B498-43B3-948B-1728B52AA6E4}">
+                <adec:decorative xmlns:adec="http://schemas.microsoft.com/office/drawing/2017/decorative" val="1"/>
+              </a:ext>
+            </a:extLst>
+          </p:cNvPr>
+          <p:cNvCxnSpPr>
+            <a:cxnSpLocks noGrp="1" noRot="1" noChangeAspect="1" noMove="1" noResize="1" noEditPoints="1" noAdjustHandles="1" noChangeArrowheads="1" noChangeShapeType="1"/>
+          </p:cNvCxnSpPr>
+          <p:nvPr>
+            <p:extLst>
+              <p:ext uri="{386F3935-93C4-4BCD-93E2-E3B085C9AB24}">
+                <p16:designElem xmlns:p16="http://schemas.microsoft.com/office/powerpoint/2015/main" val="1"/>
+              </p:ext>
+            </p:extLst>
+          </p:nvPr>
+        </p:nvCxnSpPr>
+        <p:spPr>
+          <a:xfrm>
+            <a:off x="2417780" y="3528542"/>
+            <a:ext cx="8637072" cy="0"/>
+          </a:xfrm>
+          <a:prstGeom prst="line">
+            <a:avLst/>
+          </a:prstGeom>
+          <a:ln w="31750"/>
+        </p:spPr>
+        <p:style>
+          <a:lnRef idx="3">
+            <a:schemeClr val="accent1"/>
+          </a:lnRef>
+          <a:fillRef idx="0">
+            <a:schemeClr val="accent1"/>
+          </a:fillRef>
+          <a:effectRef idx="2">
+            <a:schemeClr val="accent1"/>
+          </a:effectRef>
+          <a:fontRef idx="minor">
+            <a:schemeClr val="tx1"/>
+          </a:fontRef>
+        </p:style>
+      </p:cxnSp>
+      <p:sp useBgFill="1">
+        <p:nvSpPr>
+          <p:cNvPr id="15" name="Rectangle 14">
+            <a:extLst>
+              <a:ext uri="{FF2B5EF4-FFF2-40B4-BE49-F238E27FC236}">
+                <a16:creationId xmlns:a16="http://schemas.microsoft.com/office/drawing/2014/main" id="{1EE485E7-7D6D-4CB0-A3AD-261D97B2EFEA}"/>
+              </a:ext>
+              <a:ext uri="{C183D7F6-B498-43B3-948B-1728B52AA6E4}">
+                <adec:decorative xmlns:adec="http://schemas.microsoft.com/office/drawing/2017/decorative" val="1"/>
+              </a:ext>
+            </a:extLst>
+          </p:cNvPr>
+          <p:cNvSpPr>
+            <a:spLocks noGrp="1" noRot="1" noChangeAspect="1" noMove="1" noResize="1" noEditPoints="1" noAdjustHandles="1" noChangeArrowheads="1" noChangeShapeType="1" noTextEdit="1"/>
+          </p:cNvSpPr>
+          <p:nvPr>
+            <p:extLst>
+              <p:ext uri="{386F3935-93C4-4BCD-93E2-E3B085C9AB24}">
+                <p16:designElem xmlns:p16="http://schemas.microsoft.com/office/powerpoint/2015/main" val="1"/>
+              </p:ext>
+            </p:extLst>
+          </p:nvPr>
+        </p:nvSpPr>
+        <p:spPr>
+          <a:xfrm>
+            <a:off x="2" y="0"/>
+            <a:ext cx="12191695" cy="6858000"/>
+          </a:xfrm>
+          <a:prstGeom prst="rect">
+            <a:avLst/>
+          </a:prstGeom>
+          <a:ln>
+            <a:noFill/>
+          </a:ln>
+        </p:spPr>
+        <p:style>
+          <a:lnRef idx="2">
+            <a:schemeClr val="accent1">
+              <a:shade val="50000"/>
+            </a:schemeClr>
+          </a:lnRef>
+          <a:fillRef idx="1">
+            <a:schemeClr val="accent1"/>
+          </a:fillRef>
+          <a:effectRef idx="0">
+            <a:schemeClr val="accent1"/>
+          </a:effectRef>
+          <a:fontRef idx="minor">
+            <a:schemeClr val="lt1"/>
+          </a:fontRef>
+        </p:style>
+        <p:txBody>
+          <a:bodyPr rtlCol="0" anchor="ctr"/>
+          <a:lstStyle/>
+          <a:p>
+            <a:pPr algn="ctr"/>
+            <a:endParaRPr lang="en-US"/>
+          </a:p>
+        </p:txBody>
+      </p:sp>
+      <p:sp>
+        <p:nvSpPr>
+          <p:cNvPr id="17" name="Rectangle 16">
+            <a:extLst>
+              <a:ext uri="{FF2B5EF4-FFF2-40B4-BE49-F238E27FC236}">
+                <a16:creationId xmlns:a16="http://schemas.microsoft.com/office/drawing/2014/main" id="{A55E3208-F0C4-4962-8946-065C94F89635}"/>
+              </a:ext>
+              <a:ext uri="{C183D7F6-B498-43B3-948B-1728B52AA6E4}">
+                <adec:decorative xmlns:adec="http://schemas.microsoft.com/office/drawing/2017/decorative" val="1"/>
+              </a:ext>
+            </a:extLst>
+          </p:cNvPr>
+          <p:cNvSpPr>
+            <a:spLocks noGrp="1" noRot="1" noChangeAspect="1" noMove="1" noResize="1" noEditPoints="1" noAdjustHandles="1" noChangeArrowheads="1" noChangeShapeType="1" noTextEdit="1"/>
+          </p:cNvSpPr>
+          <p:nvPr>
+            <p:extLst>
+              <p:ext uri="{386F3935-93C4-4BCD-93E2-E3B085C9AB24}">
+                <p16:designElem xmlns:p16="http://schemas.microsoft.com/office/powerpoint/2015/main" val="1"/>
+              </p:ext>
+            </p:extLst>
+          </p:nvPr>
+        </p:nvSpPr>
+        <p:spPr>
+          <a:xfrm>
+            <a:off x="0" y="2019476"/>
+            <a:ext cx="12192000" cy="4105941"/>
+          </a:xfrm>
+          <a:prstGeom prst="rect">
+            <a:avLst/>
+          </a:prstGeom>
+          <a:gradFill flip="none" rotWithShape="1">
+            <a:gsLst>
+              <a:gs pos="0">
+                <a:schemeClr val="bg2">
+                  <a:alpha val="0"/>
+                </a:schemeClr>
+              </a:gs>
+              <a:gs pos="100000">
+                <a:schemeClr val="bg2"/>
+              </a:gs>
+            </a:gsLst>
+            <a:lin ang="5400000" scaled="0"/>
+            <a:tileRect/>
+          </a:gradFill>
+          <a:ln>
+            <a:noFill/>
+          </a:ln>
+        </p:spPr>
+        <p:style>
+          <a:lnRef idx="2">
+            <a:schemeClr val="accent1">
+              <a:shade val="50000"/>
+            </a:schemeClr>
+          </a:lnRef>
+          <a:fillRef idx="1">
+            <a:schemeClr val="accent1"/>
+          </a:fillRef>
+          <a:effectRef idx="0">
+            <a:schemeClr val="accent1"/>
+          </a:effectRef>
+          <a:fontRef idx="minor">
+            <a:schemeClr val="lt1"/>
+          </a:fontRef>
+        </p:style>
+        <p:txBody>
+          <a:bodyPr rtlCol="0" anchor="ctr"/>
+          <a:lstStyle/>
+          <a:p>
+            <a:pPr lvl="0" algn="ctr"/>
+            <a:endParaRPr lang="en-US" dirty="0"/>
+          </a:p>
+        </p:txBody>
+      </p:sp>
+      <p:sp>
+        <p:nvSpPr>
           <p:cNvPr id="2" name="Title 1">
             <a:extLst>
               <a:ext uri="{FF2B5EF4-FFF2-40B4-BE49-F238E27FC236}">
@@ -9009,44 +9898,178 @@
             <p:ph type="title"/>
           </p:nvPr>
         </p:nvSpPr>
-        <p:spPr/>
+        <p:spPr>
+          <a:xfrm>
+            <a:off x="5140235" y="1027937"/>
+            <a:ext cx="6083708" cy="3711894"/>
+          </a:xfrm>
+        </p:spPr>
         <p:txBody>
-          <a:bodyPr/>
+          <a:bodyPr vert="horz" lIns="91440" tIns="45720" rIns="91440" bIns="0" rtlCol="0" anchor="ctr">
+            <a:normAutofit/>
+          </a:bodyPr>
           <a:lstStyle/>
           <a:p>
             <a:r>
-              <a:rPr lang="en-US" dirty="0"/>
-              <a:t>objective</a:t>
+              <a:rPr lang="en-US" sz="5400"/>
+              <a:t>Tableau </a:t>
             </a:r>
-            <a:endParaRPr lang="en-AU" dirty="0"/>
+            <a:br>
+              <a:rPr lang="en-US" sz="5400"/>
+            </a:br>
+            <a:r>
+              <a:rPr lang="en-US" sz="5400"/>
+              <a:t>visualisations</a:t>
+            </a:r>
           </a:p>
         </p:txBody>
       </p:sp>
-      <p:sp>
-        <p:nvSpPr>
-          <p:cNvPr id="3" name="Content Placeholder 2">
+      <p:cxnSp>
+        <p:nvCxnSpPr>
+          <p:cNvPr id="19" name="Straight Connector 18">
             <a:extLst>
               <a:ext uri="{FF2B5EF4-FFF2-40B4-BE49-F238E27FC236}">
-                <a16:creationId xmlns:a16="http://schemas.microsoft.com/office/drawing/2014/main" id="{50EB7F42-1D17-E5BF-B407-3152C97FDCF7}"/>
+                <a16:creationId xmlns:a16="http://schemas.microsoft.com/office/drawing/2014/main" id="{4FAE17D3-C2DC-4665-AF20-33C5BACD5E01}"/>
+              </a:ext>
+              <a:ext uri="{C183D7F6-B498-43B3-948B-1728B52AA6E4}">
+                <adec:decorative xmlns:adec="http://schemas.microsoft.com/office/drawing/2017/decorative" val="1"/>
               </a:ext>
             </a:extLst>
           </p:cNvPr>
-          <p:cNvSpPr>
-            <a:spLocks noGrp="1"/>
-          </p:cNvSpPr>
-          <p:nvPr>
-            <p:ph idx="1"/>
-          </p:nvPr>
-        </p:nvSpPr>
-        <p:spPr/>
-        <p:txBody>
-          <a:bodyPr/>
-          <a:lstStyle/>
-          <a:p>
-            <a:endParaRPr lang="en-AU" dirty="0"/>
-          </a:p>
-        </p:txBody>
-      </p:sp>
+          <p:cNvCxnSpPr>
+            <a:cxnSpLocks noGrp="1" noRot="1" noChangeAspect="1" noMove="1" noResize="1" noEditPoints="1" noAdjustHandles="1" noChangeArrowheads="1" noChangeShapeType="1"/>
+          </p:cNvCxnSpPr>
+          <p:nvPr>
+            <p:extLst>
+              <p:ext uri="{386F3935-93C4-4BCD-93E2-E3B085C9AB24}">
+                <p16:designElem xmlns:p16="http://schemas.microsoft.com/office/powerpoint/2015/main" val="1"/>
+              </p:ext>
+            </p:extLst>
+          </p:nvPr>
+        </p:nvCxnSpPr>
+        <p:spPr>
+          <a:xfrm>
+            <a:off x="4654296" y="1375124"/>
+            <a:ext cx="0" cy="3017520"/>
+          </a:xfrm>
+          <a:prstGeom prst="line">
+            <a:avLst/>
+          </a:prstGeom>
+          <a:ln w="31750"/>
+        </p:spPr>
+        <p:style>
+          <a:lnRef idx="1">
+            <a:schemeClr val="accent1"/>
+          </a:lnRef>
+          <a:fillRef idx="0">
+            <a:schemeClr val="accent1"/>
+          </a:fillRef>
+          <a:effectRef idx="0">
+            <a:schemeClr val="accent1"/>
+          </a:effectRef>
+          <a:fontRef idx="minor">
+            <a:schemeClr val="tx1"/>
+          </a:fontRef>
+        </p:style>
+      </p:cxnSp>
+      <p:pic>
+        <p:nvPicPr>
+          <p:cNvPr id="21" name="Picture 20">
+            <a:extLst>
+              <a:ext uri="{FF2B5EF4-FFF2-40B4-BE49-F238E27FC236}">
+                <a16:creationId xmlns:a16="http://schemas.microsoft.com/office/drawing/2014/main" id="{7021C573-B3FF-44B8-A5DE-AB39E9AA6B96}"/>
+              </a:ext>
+              <a:ext uri="{C183D7F6-B498-43B3-948B-1728B52AA6E4}">
+                <adec:decorative xmlns:adec="http://schemas.microsoft.com/office/drawing/2017/decorative" val="1"/>
+              </a:ext>
+            </a:extLst>
+          </p:cNvPr>
+          <p:cNvPicPr>
+            <a:picLocks noGrp="1" noRot="1" noChangeAspect="1" noMove="1" noResize="1" noEditPoints="1" noAdjustHandles="1" noChangeArrowheads="1" noChangeShapeType="1" noCrop="1"/>
+          </p:cNvPicPr>
+          <p:nvPr>
+            <p:extLst>
+              <p:ext uri="{386F3935-93C4-4BCD-93E2-E3B085C9AB24}">
+                <p16:designElem xmlns:p16="http://schemas.microsoft.com/office/powerpoint/2015/main" val="1"/>
+              </p:ext>
+            </p:extLst>
+          </p:nvPr>
+        </p:nvPicPr>
+        <p:blipFill rotWithShape="1">
+          <a:blip r:embed="rId3">
+            <a:extLst>
+              <a:ext uri="{28A0092B-C50C-407E-A947-70E740481C1C}">
+                <a14:useLocalDpi xmlns:a14="http://schemas.microsoft.com/office/drawing/2010/main" val="0"/>
+              </a:ext>
+            </a:extLst>
+          </a:blip>
+          <a:srcRect t="1538" b="-1538"/>
+          <a:stretch/>
+        </p:blipFill>
+        <p:spPr bwMode="black">
+          <a:xfrm>
+            <a:off x="0" y="6126480"/>
+            <a:ext cx="12192000" cy="742950"/>
+          </a:xfrm>
+          <a:prstGeom prst="rect">
+            <a:avLst/>
+          </a:prstGeom>
+        </p:spPr>
+      </p:pic>
+      <p:cxnSp>
+        <p:nvCxnSpPr>
+          <p:cNvPr id="23" name="Straight Connector 22">
+            <a:extLst>
+              <a:ext uri="{FF2B5EF4-FFF2-40B4-BE49-F238E27FC236}">
+                <a16:creationId xmlns:a16="http://schemas.microsoft.com/office/drawing/2014/main" id="{50B0CCD4-E9B0-43B2-806F-05EDF57A7628}"/>
+              </a:ext>
+              <a:ext uri="{C183D7F6-B498-43B3-948B-1728B52AA6E4}">
+                <adec:decorative xmlns:adec="http://schemas.microsoft.com/office/drawing/2017/decorative" val="1"/>
+              </a:ext>
+            </a:extLst>
+          </p:cNvPr>
+          <p:cNvCxnSpPr>
+            <a:cxnSpLocks noGrp="1" noRot="1" noChangeAspect="1" noMove="1" noResize="1" noEditPoints="1" noAdjustHandles="1" noChangeArrowheads="1" noChangeShapeType="1"/>
+          </p:cNvCxnSpPr>
+          <p:nvPr>
+            <p:extLst>
+              <p:ext uri="{386F3935-93C4-4BCD-93E2-E3B085C9AB24}">
+                <p16:designElem xmlns:p16="http://schemas.microsoft.com/office/powerpoint/2015/main" val="1"/>
+              </p:ext>
+            </p:extLst>
+          </p:nvPr>
+        </p:nvCxnSpPr>
+        <p:spPr>
+          <a:xfrm>
+            <a:off x="0" y="6128413"/>
+            <a:ext cx="12192000" cy="0"/>
+          </a:xfrm>
+          <a:prstGeom prst="line">
+            <a:avLst/>
+          </a:prstGeom>
+          <a:ln w="12700">
+            <a:solidFill>
+              <a:srgbClr val="000001">
+                <a:alpha val="20000"/>
+              </a:srgbClr>
+            </a:solidFill>
+          </a:ln>
+        </p:spPr>
+        <p:style>
+          <a:lnRef idx="1">
+            <a:schemeClr val="accent1"/>
+          </a:lnRef>
+          <a:fillRef idx="0">
+            <a:schemeClr val="accent1"/>
+          </a:fillRef>
+          <a:effectRef idx="0">
+            <a:schemeClr val="accent1"/>
+          </a:effectRef>
+          <a:fontRef idx="minor">
+            <a:schemeClr val="tx1"/>
+          </a:fontRef>
+        </p:style>
+      </p:cxnSp>
     </p:spTree>
     <p:extLst>
       <p:ext uri="{BB962C8B-B14F-4D97-AF65-F5344CB8AC3E}">
@@ -10039,11 +11062,7 @@
           <a:p>
             <a:r>
               <a:rPr lang="en-US" dirty="0"/>
-              <a:t>Tableau </a:t>
-            </a:r>
-            <a:r>
-              <a:rPr lang="en-US" dirty="0" err="1"/>
-              <a:t>visualisations</a:t>
+              <a:t>Tableau visualisations</a:t>
             </a:r>
             <a:endParaRPr lang="en-AU" dirty="0"/>
           </a:p>
@@ -10066,7 +11085,7 @@
           </p:nvPr>
         </p:nvPicPr>
         <p:blipFill>
-          <a:blip r:embed="rId2"/>
+          <a:blip r:embed="rId3"/>
           <a:stretch>
             <a:fillRect/>
           </a:stretch>
@@ -10082,6 +11101,712 @@
     <p:extLst>
       <p:ext uri="{BB962C8B-B14F-4D97-AF65-F5344CB8AC3E}">
         <p14:creationId xmlns:p14="http://schemas.microsoft.com/office/powerpoint/2010/main" val="146719654"/>
+      </p:ext>
+    </p:extLst>
+  </p:cSld>
+  <p:clrMapOvr>
+    <a:masterClrMapping/>
+  </p:clrMapOvr>
+</p:sld>
+</file>
+
+<file path=ppt/slides/slide13.xml><?xml version="1.0" encoding="utf-8"?>
+<p:sld xmlns:a="http://schemas.openxmlformats.org/drawingml/2006/main" xmlns:r="http://schemas.openxmlformats.org/officeDocument/2006/relationships" xmlns:p="http://schemas.openxmlformats.org/presentationml/2006/main">
+  <p:cSld>
+    <p:bg>
+      <p:bgPr>
+        <a:gradFill rotWithShape="1">
+          <a:gsLst>
+            <a:gs pos="0">
+              <a:schemeClr val="bg2">
+                <a:tint val="94000"/>
+                <a:satMod val="80000"/>
+                <a:lumMod val="106000"/>
+              </a:schemeClr>
+            </a:gs>
+            <a:gs pos="100000">
+              <a:schemeClr val="bg2">
+                <a:shade val="80000"/>
+              </a:schemeClr>
+            </a:gs>
+          </a:gsLst>
+          <a:path path="circle">
+            <a:fillToRect l="43000" r="43000" b="100000"/>
+          </a:path>
+        </a:gradFill>
+        <a:effectLst/>
+      </p:bgPr>
+    </p:bg>
+    <p:spTree>
+      <p:nvGrpSpPr>
+        <p:cNvPr id="1" name=""/>
+        <p:cNvGrpSpPr/>
+        <p:nvPr/>
+      </p:nvGrpSpPr>
+      <p:grpSpPr>
+        <a:xfrm>
+          <a:off x="0" y="0"/>
+          <a:ext cx="0" cy="0"/>
+          <a:chOff x="0" y="0"/>
+          <a:chExt cx="0" cy="0"/>
+        </a:xfrm>
+      </p:grpSpPr>
+      <p:sp useBgFill="1">
+        <p:nvSpPr>
+          <p:cNvPr id="10" name="Rectangle 9">
+            <a:extLst>
+              <a:ext uri="{FF2B5EF4-FFF2-40B4-BE49-F238E27FC236}">
+                <a16:creationId xmlns:a16="http://schemas.microsoft.com/office/drawing/2014/main" id="{56412368-7E6B-4064-B6FA-72DF6DA0C2DB}"/>
+              </a:ext>
+              <a:ext uri="{C183D7F6-B498-43B3-948B-1728B52AA6E4}">
+                <adec:decorative xmlns:adec="http://schemas.microsoft.com/office/drawing/2017/decorative" val="1"/>
+              </a:ext>
+            </a:extLst>
+          </p:cNvPr>
+          <p:cNvSpPr>
+            <a:spLocks noGrp="1" noRot="1" noChangeAspect="1" noMove="1" noResize="1" noEditPoints="1" noAdjustHandles="1" noChangeArrowheads="1" noChangeShapeType="1" noTextEdit="1"/>
+          </p:cNvSpPr>
+          <p:nvPr>
+            <p:extLst>
+              <p:ext uri="{386F3935-93C4-4BCD-93E2-E3B085C9AB24}">
+                <p16:designElem xmlns:p16="http://schemas.microsoft.com/office/powerpoint/2015/main" val="1"/>
+              </p:ext>
+            </p:extLst>
+          </p:nvPr>
+        </p:nvSpPr>
+        <p:spPr>
+          <a:xfrm>
+            <a:off x="2" y="0"/>
+            <a:ext cx="12191695" cy="6858000"/>
+          </a:xfrm>
+          <a:prstGeom prst="rect">
+            <a:avLst/>
+          </a:prstGeom>
+          <a:ln>
+            <a:noFill/>
+          </a:ln>
+        </p:spPr>
+        <p:style>
+          <a:lnRef idx="2">
+            <a:schemeClr val="accent1">
+              <a:shade val="50000"/>
+            </a:schemeClr>
+          </a:lnRef>
+          <a:fillRef idx="1">
+            <a:schemeClr val="accent1"/>
+          </a:fillRef>
+          <a:effectRef idx="0">
+            <a:schemeClr val="accent1"/>
+          </a:effectRef>
+          <a:fontRef idx="minor">
+            <a:schemeClr val="lt1"/>
+          </a:fontRef>
+        </p:style>
+        <p:txBody>
+          <a:bodyPr rtlCol="0" anchor="ctr"/>
+          <a:lstStyle/>
+          <a:p>
+            <a:pPr algn="ctr"/>
+            <a:endParaRPr lang="en-US"/>
+          </a:p>
+        </p:txBody>
+      </p:sp>
+      <p:sp>
+        <p:nvSpPr>
+          <p:cNvPr id="12" name="Rectangle 11">
+            <a:extLst>
+              <a:ext uri="{FF2B5EF4-FFF2-40B4-BE49-F238E27FC236}">
+                <a16:creationId xmlns:a16="http://schemas.microsoft.com/office/drawing/2014/main" id="{8014FE20-9BCC-4219-A8AD-B1C110BD558D}"/>
+              </a:ext>
+              <a:ext uri="{C183D7F6-B498-43B3-948B-1728B52AA6E4}">
+                <adec:decorative xmlns:adec="http://schemas.microsoft.com/office/drawing/2017/decorative" val="1"/>
+              </a:ext>
+            </a:extLst>
+          </p:cNvPr>
+          <p:cNvSpPr>
+            <a:spLocks noGrp="1" noRot="1" noChangeAspect="1" noMove="1" noResize="1" noEditPoints="1" noAdjustHandles="1" noChangeArrowheads="1" noChangeShapeType="1" noTextEdit="1"/>
+          </p:cNvSpPr>
+          <p:nvPr>
+            <p:extLst>
+              <p:ext uri="{386F3935-93C4-4BCD-93E2-E3B085C9AB24}">
+                <p16:designElem xmlns:p16="http://schemas.microsoft.com/office/powerpoint/2015/main" val="1"/>
+              </p:ext>
+            </p:extLst>
+          </p:nvPr>
+        </p:nvSpPr>
+        <p:spPr>
+          <a:xfrm>
+            <a:off x="0" y="2019476"/>
+            <a:ext cx="12192000" cy="4105941"/>
+          </a:xfrm>
+          <a:prstGeom prst="rect">
+            <a:avLst/>
+          </a:prstGeom>
+          <a:gradFill flip="none" rotWithShape="1">
+            <a:gsLst>
+              <a:gs pos="0">
+                <a:schemeClr val="bg2">
+                  <a:alpha val="0"/>
+                </a:schemeClr>
+              </a:gs>
+              <a:gs pos="100000">
+                <a:schemeClr val="bg2"/>
+              </a:gs>
+            </a:gsLst>
+            <a:lin ang="5400000" scaled="0"/>
+            <a:tileRect/>
+          </a:gradFill>
+          <a:ln>
+            <a:noFill/>
+          </a:ln>
+        </p:spPr>
+        <p:style>
+          <a:lnRef idx="2">
+            <a:schemeClr val="accent1">
+              <a:shade val="50000"/>
+            </a:schemeClr>
+          </a:lnRef>
+          <a:fillRef idx="1">
+            <a:schemeClr val="accent1"/>
+          </a:fillRef>
+          <a:effectRef idx="0">
+            <a:schemeClr val="accent1"/>
+          </a:effectRef>
+          <a:fontRef idx="minor">
+            <a:schemeClr val="lt1"/>
+          </a:fontRef>
+        </p:style>
+        <p:txBody>
+          <a:bodyPr rtlCol="0" anchor="ctr"/>
+          <a:lstStyle/>
+          <a:p>
+            <a:pPr lvl="0" algn="ctr"/>
+            <a:endParaRPr lang="en-US"/>
+          </a:p>
+        </p:txBody>
+      </p:sp>
+      <p:sp>
+        <p:nvSpPr>
+          <p:cNvPr id="2" name="Title 1">
+            <a:extLst>
+              <a:ext uri="{FF2B5EF4-FFF2-40B4-BE49-F238E27FC236}">
+                <a16:creationId xmlns:a16="http://schemas.microsoft.com/office/drawing/2014/main" id="{07877A09-01AA-528A-F683-EC32FC2B2DB8}"/>
+              </a:ext>
+            </a:extLst>
+          </p:cNvPr>
+          <p:cNvSpPr>
+            <a:spLocks noGrp="1"/>
+          </p:cNvSpPr>
+          <p:nvPr>
+            <p:ph type="ctrTitle"/>
+          </p:nvPr>
+        </p:nvSpPr>
+        <p:spPr>
+          <a:xfrm>
+            <a:off x="1452617" y="976508"/>
+            <a:ext cx="5525305" cy="2367221"/>
+          </a:xfrm>
+        </p:spPr>
+        <p:txBody>
+          <a:bodyPr>
+            <a:normAutofit/>
+          </a:bodyPr>
+          <a:lstStyle/>
+          <a:p>
+            <a:r>
+              <a:rPr lang="en-AU" sz="5400"/>
+              <a:t>The end</a:t>
+            </a:r>
+          </a:p>
+        </p:txBody>
+      </p:sp>
+      <p:sp>
+        <p:nvSpPr>
+          <p:cNvPr id="3" name="Subtitle 2">
+            <a:extLst>
+              <a:ext uri="{FF2B5EF4-FFF2-40B4-BE49-F238E27FC236}">
+                <a16:creationId xmlns:a16="http://schemas.microsoft.com/office/drawing/2014/main" id="{7FD60024-3169-0CE2-F7F5-33A1094FE3EB}"/>
+              </a:ext>
+            </a:extLst>
+          </p:cNvPr>
+          <p:cNvSpPr>
+            <a:spLocks noGrp="1"/>
+          </p:cNvSpPr>
+          <p:nvPr>
+            <p:ph type="subTitle" idx="1"/>
+          </p:nvPr>
+        </p:nvSpPr>
+        <p:spPr>
+          <a:xfrm>
+            <a:off x="1452617" y="3531204"/>
+            <a:ext cx="5530919" cy="1606576"/>
+          </a:xfrm>
+        </p:spPr>
+        <p:txBody>
+          <a:bodyPr>
+            <a:normAutofit/>
+          </a:bodyPr>
+          <a:lstStyle/>
+          <a:p>
+            <a:r>
+              <a:rPr lang="en-AU"/>
+              <a:t>Any questions??</a:t>
+            </a:r>
+            <a:endParaRPr lang="en-AU" dirty="0"/>
+          </a:p>
+        </p:txBody>
+      </p:sp>
+      <p:cxnSp>
+        <p:nvCxnSpPr>
+          <p:cNvPr id="14" name="Straight Connector 13">
+            <a:extLst>
+              <a:ext uri="{FF2B5EF4-FFF2-40B4-BE49-F238E27FC236}">
+                <a16:creationId xmlns:a16="http://schemas.microsoft.com/office/drawing/2014/main" id="{A661C966-C6C8-4667-903D-E68521C357FC}"/>
+              </a:ext>
+              <a:ext uri="{C183D7F6-B498-43B3-948B-1728B52AA6E4}">
+                <adec:decorative xmlns:adec="http://schemas.microsoft.com/office/drawing/2017/decorative" val="1"/>
+              </a:ext>
+            </a:extLst>
+          </p:cNvPr>
+          <p:cNvCxnSpPr>
+            <a:cxnSpLocks noGrp="1" noRot="1" noChangeAspect="1" noMove="1" noResize="1" noEditPoints="1" noAdjustHandles="1" noChangeArrowheads="1" noChangeShapeType="1"/>
+          </p:cNvCxnSpPr>
+          <p:nvPr>
+            <p:extLst>
+              <p:ext uri="{386F3935-93C4-4BCD-93E2-E3B085C9AB24}">
+                <p16:designElem xmlns:p16="http://schemas.microsoft.com/office/powerpoint/2015/main" val="1"/>
+              </p:ext>
+            </p:extLst>
+          </p:nvPr>
+        </p:nvCxnSpPr>
+        <p:spPr>
+          <a:xfrm>
+            <a:off x="1452618" y="3528543"/>
+            <a:ext cx="5536119" cy="0"/>
+          </a:xfrm>
+          <a:prstGeom prst="line">
+            <a:avLst/>
+          </a:prstGeom>
+          <a:ln w="31750"/>
+        </p:spPr>
+        <p:style>
+          <a:lnRef idx="3">
+            <a:schemeClr val="accent1"/>
+          </a:lnRef>
+          <a:fillRef idx="0">
+            <a:schemeClr val="accent1"/>
+          </a:fillRef>
+          <a:effectRef idx="2">
+            <a:schemeClr val="accent1"/>
+          </a:effectRef>
+          <a:fontRef idx="minor">
+            <a:schemeClr val="tx1"/>
+          </a:fontRef>
+        </p:style>
+      </p:cxnSp>
+      <p:grpSp>
+        <p:nvGrpSpPr>
+          <p:cNvPr id="16" name="Group 15">
+            <a:extLst>
+              <a:ext uri="{FF2B5EF4-FFF2-40B4-BE49-F238E27FC236}">
+                <a16:creationId xmlns:a16="http://schemas.microsoft.com/office/drawing/2014/main" id="{36439133-030D-427C-AADE-2B48B1991785}"/>
+              </a:ext>
+              <a:ext uri="{C183D7F6-B498-43B3-948B-1728B52AA6E4}">
+                <adec:decorative xmlns:adec="http://schemas.microsoft.com/office/drawing/2017/decorative" val="1"/>
+              </a:ext>
+            </a:extLst>
+          </p:cNvPr>
+          <p:cNvGrpSpPr>
+            <a:grpSpLocks noGrp="1" noUngrp="1" noRot="1" noChangeAspect="1" noMove="1" noResize="1"/>
+          </p:cNvGrpSpPr>
+          <p:nvPr>
+            <p:extLst>
+              <p:ext uri="{386F3935-93C4-4BCD-93E2-E3B085C9AB24}">
+                <p16:designElem xmlns:p16="http://schemas.microsoft.com/office/powerpoint/2015/main" val="1"/>
+              </p:ext>
+            </p:extLst>
+          </p:nvPr>
+        </p:nvGrpSpPr>
+        <p:grpSpPr>
+          <a:xfrm>
+            <a:off x="7477388" y="482171"/>
+            <a:ext cx="4074533" cy="5149101"/>
+            <a:chOff x="7477388" y="482171"/>
+            <a:chExt cx="4074533" cy="5149101"/>
+          </a:xfrm>
+        </p:grpSpPr>
+        <p:sp>
+          <p:nvSpPr>
+            <p:cNvPr id="17" name="Rectangle 16">
+              <a:extLst>
+                <a:ext uri="{FF2B5EF4-FFF2-40B4-BE49-F238E27FC236}">
+                  <a16:creationId xmlns:a16="http://schemas.microsoft.com/office/drawing/2014/main" id="{2C11378B-6628-411A-9A79-CF10232D7DFD}"/>
+                </a:ext>
+                <a:ext uri="{C183D7F6-B498-43B3-948B-1728B52AA6E4}">
+                  <adec:decorative xmlns:adec="http://schemas.microsoft.com/office/drawing/2017/decorative" val="1"/>
+                </a:ext>
+              </a:extLst>
+            </p:cNvPr>
+            <p:cNvSpPr/>
+            <p:nvPr>
+              <p:extLst>
+                <p:ext uri="{386F3935-93C4-4BCD-93E2-E3B085C9AB24}">
+                  <p16:designElem xmlns:p16="http://schemas.microsoft.com/office/powerpoint/2015/main" val="1"/>
+                </p:ext>
+              </p:extLst>
+            </p:nvPr>
+          </p:nvSpPr>
+          <p:spPr>
+            <a:xfrm>
+              <a:off x="7477388" y="482171"/>
+              <a:ext cx="4074533" cy="5149101"/>
+            </a:xfrm>
+            <a:prstGeom prst="rect">
+              <a:avLst/>
+            </a:prstGeom>
+            <a:gradFill>
+              <a:gsLst>
+                <a:gs pos="0">
+                  <a:srgbClr val="000001"/>
+                </a:gs>
+                <a:gs pos="100000">
+                  <a:srgbClr val="191919"/>
+                </a:gs>
+              </a:gsLst>
+            </a:gradFill>
+            <a:ln w="76200" cmpd="sng">
+              <a:noFill/>
+              <a:miter lim="800000"/>
+            </a:ln>
+            <a:effectLst>
+              <a:outerShdw blurRad="127000" dist="228600" dir="4740000" sx="98000" sy="98000" algn="tl" rotWithShape="0">
+                <a:srgbClr val="000000">
+                  <a:alpha val="34000"/>
+                </a:srgbClr>
+              </a:outerShdw>
+            </a:effectLst>
+            <a:scene3d>
+              <a:camera prst="orthographicFront"/>
+              <a:lightRig rig="threePt" dir="t"/>
+            </a:scene3d>
+            <a:sp3d>
+              <a:bevelT w="152400" h="50800" prst="softRound"/>
+            </a:sp3d>
+          </p:spPr>
+          <p:style>
+            <a:lnRef idx="1">
+              <a:schemeClr val="accent1"/>
+            </a:lnRef>
+            <a:fillRef idx="3">
+              <a:schemeClr val="accent1"/>
+            </a:fillRef>
+            <a:effectRef idx="2">
+              <a:schemeClr val="accent1"/>
+            </a:effectRef>
+            <a:fontRef idx="minor">
+              <a:schemeClr val="lt1"/>
+            </a:fontRef>
+          </p:style>
+          <p:txBody>
+            <a:bodyPr rtlCol="0" anchor="ctr"/>
+            <a:lstStyle/>
+            <a:p>
+              <a:pPr algn="ctr"/>
+              <a:endParaRPr lang="en-US"/>
+            </a:p>
+          </p:txBody>
+        </p:sp>
+        <p:sp>
+          <p:nvSpPr>
+            <p:cNvPr id="18" name="Rectangle 17">
+              <a:extLst>
+                <a:ext uri="{FF2B5EF4-FFF2-40B4-BE49-F238E27FC236}">
+                  <a16:creationId xmlns:a16="http://schemas.microsoft.com/office/drawing/2014/main" id="{08E6BF6A-26B8-45E6-887E-FE78A7984F48}"/>
+                </a:ext>
+                <a:ext uri="{C183D7F6-B498-43B3-948B-1728B52AA6E4}">
+                  <adec:decorative xmlns:adec="http://schemas.microsoft.com/office/drawing/2017/decorative" val="1"/>
+                </a:ext>
+              </a:extLst>
+            </p:cNvPr>
+            <p:cNvSpPr/>
+            <p:nvPr>
+              <p:extLst>
+                <p:ext uri="{386F3935-93C4-4BCD-93E2-E3B085C9AB24}">
+                  <p16:designElem xmlns:p16="http://schemas.microsoft.com/office/powerpoint/2015/main" val="1"/>
+                </p:ext>
+              </p:extLst>
+            </p:nvPr>
+          </p:nvSpPr>
+          <p:spPr>
+            <a:xfrm>
+              <a:off x="7790447" y="812507"/>
+              <a:ext cx="3450289" cy="4466452"/>
+            </a:xfrm>
+            <a:prstGeom prst="rect">
+              <a:avLst/>
+            </a:prstGeom>
+            <a:gradFill>
+              <a:gsLst>
+                <a:gs pos="0">
+                  <a:srgbClr val="DADADA"/>
+                </a:gs>
+                <a:gs pos="100000">
+                  <a:srgbClr val="FFFFFE"/>
+                </a:gs>
+              </a:gsLst>
+              <a:lin ang="16200000" scaled="0"/>
+            </a:gradFill>
+            <a:ln w="50800" cmpd="sng">
+              <a:solidFill>
+                <a:srgbClr val="191919"/>
+              </a:solidFill>
+              <a:miter lim="800000"/>
+            </a:ln>
+            <a:effectLst>
+              <a:innerShdw blurRad="63500" dist="88900" dir="14100000">
+                <a:srgbClr val="000000">
+                  <a:alpha val="30000"/>
+                </a:srgbClr>
+              </a:innerShdw>
+            </a:effectLst>
+            <a:scene3d>
+              <a:camera prst="orthographicFront"/>
+              <a:lightRig rig="threePt" dir="t"/>
+            </a:scene3d>
+            <a:sp3d>
+              <a:bevelT prst="relaxedInset"/>
+            </a:sp3d>
+          </p:spPr>
+          <p:style>
+            <a:lnRef idx="1">
+              <a:schemeClr val="accent1"/>
+            </a:lnRef>
+            <a:fillRef idx="3">
+              <a:schemeClr val="accent1"/>
+            </a:fillRef>
+            <a:effectRef idx="2">
+              <a:schemeClr val="accent1"/>
+            </a:effectRef>
+            <a:fontRef idx="minor">
+              <a:schemeClr val="lt1"/>
+            </a:fontRef>
+          </p:style>
+          <p:txBody>
+            <a:bodyPr rtlCol="0" anchor="ctr"/>
+            <a:lstStyle/>
+            <a:p>
+              <a:pPr algn="ctr"/>
+              <a:endParaRPr lang="en-US"/>
+            </a:p>
+          </p:txBody>
+        </p:sp>
+      </p:grpSp>
+      <p:sp>
+        <p:nvSpPr>
+          <p:cNvPr id="20" name="Rectangle 19">
+            <a:extLst>
+              <a:ext uri="{FF2B5EF4-FFF2-40B4-BE49-F238E27FC236}">
+                <a16:creationId xmlns:a16="http://schemas.microsoft.com/office/drawing/2014/main" id="{82388B0B-738B-4313-8674-79D97E74A005}"/>
+              </a:ext>
+              <a:ext uri="{C183D7F6-B498-43B3-948B-1728B52AA6E4}">
+                <adec:decorative xmlns:adec="http://schemas.microsoft.com/office/drawing/2017/decorative" val="1"/>
+              </a:ext>
+            </a:extLst>
+          </p:cNvPr>
+          <p:cNvSpPr>
+            <a:spLocks noGrp="1" noRot="1" noChangeAspect="1" noMove="1" noResize="1" noEditPoints="1" noAdjustHandles="1" noChangeArrowheads="1" noChangeShapeType="1" noTextEdit="1"/>
+          </p:cNvSpPr>
+          <p:nvPr>
+            <p:extLst>
+              <p:ext uri="{386F3935-93C4-4BCD-93E2-E3B085C9AB24}">
+                <p16:designElem xmlns:p16="http://schemas.microsoft.com/office/powerpoint/2015/main" val="1"/>
+              </p:ext>
+            </p:extLst>
+          </p:nvPr>
+        </p:nvSpPr>
+        <p:spPr>
+          <a:xfrm>
+            <a:off x="7951624" y="977965"/>
+            <a:ext cx="3119444" cy="4135339"/>
+          </a:xfrm>
+          <a:prstGeom prst="rect">
+            <a:avLst/>
+          </a:prstGeom>
+          <a:solidFill>
+            <a:schemeClr val="bg1"/>
+          </a:solidFill>
+          <a:ln w="6350">
+            <a:solidFill>
+              <a:schemeClr val="bg2"/>
+            </a:solidFill>
+          </a:ln>
+        </p:spPr>
+        <p:style>
+          <a:lnRef idx="2">
+            <a:schemeClr val="accent1">
+              <a:shade val="50000"/>
+            </a:schemeClr>
+          </a:lnRef>
+          <a:fillRef idx="1">
+            <a:schemeClr val="accent1"/>
+          </a:fillRef>
+          <a:effectRef idx="0">
+            <a:schemeClr val="accent1"/>
+          </a:effectRef>
+          <a:fontRef idx="minor">
+            <a:schemeClr val="lt1"/>
+          </a:fontRef>
+        </p:style>
+        <p:txBody>
+          <a:bodyPr rtlCol="0" anchor="ctr"/>
+          <a:lstStyle/>
+          <a:p>
+            <a:pPr algn="ctr"/>
+            <a:endParaRPr lang="en-US"/>
+          </a:p>
+        </p:txBody>
+      </p:sp>
+      <p:pic>
+        <p:nvPicPr>
+          <p:cNvPr id="7" name="Graphic 6" descr="Smiling Face with No Fill">
+            <a:extLst>
+              <a:ext uri="{FF2B5EF4-FFF2-40B4-BE49-F238E27FC236}">
+                <a16:creationId xmlns:a16="http://schemas.microsoft.com/office/drawing/2014/main" id="{C95783D7-D929-3287-6162-F35A16665F6F}"/>
+              </a:ext>
+            </a:extLst>
+          </p:cNvPr>
+          <p:cNvPicPr>
+            <a:picLocks noChangeAspect="1"/>
+          </p:cNvPicPr>
+          <p:nvPr/>
+        </p:nvPicPr>
+        <p:blipFill>
+          <a:blip r:embed="rId3">
+            <a:extLst>
+              <a:ext uri="{28A0092B-C50C-407E-A947-70E740481C1C}">
+                <a14:useLocalDpi xmlns:a14="http://schemas.microsoft.com/office/drawing/2010/main" val="0"/>
+              </a:ext>
+              <a:ext uri="{96DAC541-7B7A-43D3-8B79-37D633B846F1}">
+                <asvg:svgBlip xmlns:asvg="http://schemas.microsoft.com/office/drawing/2016/SVG/main" r:embed="rId4"/>
+              </a:ext>
+            </a:extLst>
+          </a:blip>
+          <a:stretch>
+            <a:fillRect/>
+          </a:stretch>
+        </p:blipFill>
+        <p:spPr>
+          <a:xfrm>
+            <a:off x="8116373" y="1649879"/>
+            <a:ext cx="2799103" cy="2799103"/>
+          </a:xfrm>
+          <a:prstGeom prst="rect">
+            <a:avLst/>
+          </a:prstGeom>
+        </p:spPr>
+      </p:pic>
+      <p:pic>
+        <p:nvPicPr>
+          <p:cNvPr id="42" name="Picture 21">
+            <a:extLst>
+              <a:ext uri="{FF2B5EF4-FFF2-40B4-BE49-F238E27FC236}">
+                <a16:creationId xmlns:a16="http://schemas.microsoft.com/office/drawing/2014/main" id="{6DF84359-5DD6-461B-9519-90AA2F46C1BE}"/>
+              </a:ext>
+              <a:ext uri="{C183D7F6-B498-43B3-948B-1728B52AA6E4}">
+                <adec:decorative xmlns:adec="http://schemas.microsoft.com/office/drawing/2017/decorative" val="1"/>
+              </a:ext>
+            </a:extLst>
+          </p:cNvPr>
+          <p:cNvPicPr>
+            <a:picLocks noGrp="1" noRot="1" noChangeAspect="1" noMove="1" noResize="1" noEditPoints="1" noAdjustHandles="1" noChangeArrowheads="1" noChangeShapeType="1" noCrop="1"/>
+          </p:cNvPicPr>
+          <p:nvPr>
+            <p:extLst>
+              <p:ext uri="{386F3935-93C4-4BCD-93E2-E3B085C9AB24}">
+                <p16:designElem xmlns:p16="http://schemas.microsoft.com/office/powerpoint/2015/main" val="1"/>
+              </p:ext>
+            </p:extLst>
+          </p:nvPr>
+        </p:nvPicPr>
+        <p:blipFill rotWithShape="1">
+          <a:blip r:embed="rId5">
+            <a:extLst>
+              <a:ext uri="{28A0092B-C50C-407E-A947-70E740481C1C}">
+                <a14:useLocalDpi xmlns:a14="http://schemas.microsoft.com/office/drawing/2010/main" val="0"/>
+              </a:ext>
+            </a:extLst>
+          </a:blip>
+          <a:srcRect t="1538" b="-1538"/>
+          <a:stretch/>
+        </p:blipFill>
+        <p:spPr bwMode="black">
+          <a:xfrm>
+            <a:off x="0" y="6126480"/>
+            <a:ext cx="12192000" cy="742950"/>
+          </a:xfrm>
+          <a:prstGeom prst="rect">
+            <a:avLst/>
+          </a:prstGeom>
+        </p:spPr>
+      </p:pic>
+      <p:cxnSp>
+        <p:nvCxnSpPr>
+          <p:cNvPr id="43" name="Straight Connector 23">
+            <a:extLst>
+              <a:ext uri="{FF2B5EF4-FFF2-40B4-BE49-F238E27FC236}">
+                <a16:creationId xmlns:a16="http://schemas.microsoft.com/office/drawing/2014/main" id="{E90BC892-CE86-41EE-8A3B-2178D5170C7C}"/>
+              </a:ext>
+              <a:ext uri="{C183D7F6-B498-43B3-948B-1728B52AA6E4}">
+                <adec:decorative xmlns:adec="http://schemas.microsoft.com/office/drawing/2017/decorative" val="1"/>
+              </a:ext>
+            </a:extLst>
+          </p:cNvPr>
+          <p:cNvCxnSpPr>
+            <a:cxnSpLocks noGrp="1" noRot="1" noChangeAspect="1" noMove="1" noResize="1" noEditPoints="1" noAdjustHandles="1" noChangeArrowheads="1" noChangeShapeType="1"/>
+          </p:cNvCxnSpPr>
+          <p:nvPr>
+            <p:extLst>
+              <p:ext uri="{386F3935-93C4-4BCD-93E2-E3B085C9AB24}">
+                <p16:designElem xmlns:p16="http://schemas.microsoft.com/office/powerpoint/2015/main" val="1"/>
+              </p:ext>
+            </p:extLst>
+          </p:nvPr>
+        </p:nvCxnSpPr>
+        <p:spPr>
+          <a:xfrm>
+            <a:off x="0" y="6128413"/>
+            <a:ext cx="12192000" cy="0"/>
+          </a:xfrm>
+          <a:prstGeom prst="line">
+            <a:avLst/>
+          </a:prstGeom>
+          <a:ln w="12700">
+            <a:solidFill>
+              <a:srgbClr val="000001">
+                <a:alpha val="20000"/>
+              </a:srgbClr>
+            </a:solidFill>
+          </a:ln>
+        </p:spPr>
+        <p:style>
+          <a:lnRef idx="1">
+            <a:schemeClr val="accent1"/>
+          </a:lnRef>
+          <a:fillRef idx="0">
+            <a:schemeClr val="accent1"/>
+          </a:fillRef>
+          <a:effectRef idx="0">
+            <a:schemeClr val="accent1"/>
+          </a:effectRef>
+          <a:fontRef idx="minor">
+            <a:schemeClr val="tx1"/>
+          </a:fontRef>
+        </p:style>
+      </p:cxnSp>
+    </p:spTree>
+    <p:extLst>
+      <p:ext uri="{BB962C8B-B14F-4D97-AF65-F5344CB8AC3E}">
+        <p14:creationId xmlns:p14="http://schemas.microsoft.com/office/powerpoint/2010/main" val="308313497"/>
       </p:ext>
     </p:extLst>
   </p:cSld>
@@ -10507,8 +12232,8 @@
           <a:lstStyle/>
           <a:p>
             <a:r>
-              <a:rPr lang="en-US" sz="5400"/>
-              <a:t>Why choose this topic?</a:t>
+              <a:rPr lang="en-US" sz="5400" dirty="0"/>
+              <a:t>Why I chose this topic?</a:t>
             </a:r>
           </a:p>
         </p:txBody>
@@ -11005,72 +12730,12 @@
           <a:chExt cx="0" cy="0"/>
         </a:xfrm>
       </p:grpSpPr>
-      <p:sp useBgFill="1">
+      <p:sp>
         <p:nvSpPr>
-          <p:cNvPr id="8" name="Rectangle 7">
+          <p:cNvPr id="25" name="Rectangle 24">
             <a:extLst>
               <a:ext uri="{FF2B5EF4-FFF2-40B4-BE49-F238E27FC236}">
-                <a16:creationId xmlns:a16="http://schemas.microsoft.com/office/drawing/2014/main" id="{08E7A6F0-5CD3-481E-B0F2-E7F99FE675B0}"/>
-              </a:ext>
-              <a:ext uri="{C183D7F6-B498-43B3-948B-1728B52AA6E4}">
-                <adec:decorative xmlns:adec="http://schemas.microsoft.com/office/drawing/2017/decorative" val="1"/>
-              </a:ext>
-            </a:extLst>
-          </p:cNvPr>
-          <p:cNvSpPr>
-            <a:spLocks noGrp="1" noRot="1" noChangeAspect="1" noMove="1" noResize="1" noEditPoints="1" noAdjustHandles="1" noChangeArrowheads="1" noChangeShapeType="1" noTextEdit="1"/>
-          </p:cNvSpPr>
-          <p:nvPr>
-            <p:extLst>
-              <p:ext uri="{386F3935-93C4-4BCD-93E2-E3B085C9AB24}">
-                <p16:designElem xmlns:p16="http://schemas.microsoft.com/office/powerpoint/2015/main" val="1"/>
-              </p:ext>
-            </p:extLst>
-          </p:nvPr>
-        </p:nvSpPr>
-        <p:spPr>
-          <a:xfrm>
-            <a:off x="2" y="0"/>
-            <a:ext cx="12191695" cy="6858000"/>
-          </a:xfrm>
-          <a:prstGeom prst="rect">
-            <a:avLst/>
-          </a:prstGeom>
-          <a:ln>
-            <a:noFill/>
-          </a:ln>
-        </p:spPr>
-        <p:style>
-          <a:lnRef idx="2">
-            <a:schemeClr val="accent1">
-              <a:shade val="50000"/>
-            </a:schemeClr>
-          </a:lnRef>
-          <a:fillRef idx="1">
-            <a:schemeClr val="accent1"/>
-          </a:fillRef>
-          <a:effectRef idx="0">
-            <a:schemeClr val="accent1"/>
-          </a:effectRef>
-          <a:fontRef idx="minor">
-            <a:schemeClr val="lt1"/>
-          </a:fontRef>
-        </p:style>
-        <p:txBody>
-          <a:bodyPr rtlCol="0" anchor="ctr"/>
-          <a:lstStyle/>
-          <a:p>
-            <a:pPr algn="ctr"/>
-            <a:endParaRPr lang="en-US"/>
-          </a:p>
-        </p:txBody>
-      </p:sp>
-      <p:sp>
-        <p:nvSpPr>
-          <p:cNvPr id="10" name="Rectangle 9">
-            <a:extLst>
-              <a:ext uri="{FF2B5EF4-FFF2-40B4-BE49-F238E27FC236}">
-                <a16:creationId xmlns:a16="http://schemas.microsoft.com/office/drawing/2014/main" id="{511290DF-4975-4FCD-8B8D-BBC86B836668}"/>
+                <a16:creationId xmlns:a16="http://schemas.microsoft.com/office/drawing/2014/main" id="{23522FE7-5A29-4EF6-B1EF-2CA55748A772}"/>
               </a:ext>
               <a:ext uri="{C183D7F6-B498-43B3-948B-1728B52AA6E4}">
                 <adec:decorative xmlns:adec="http://schemas.microsoft.com/office/drawing/2017/decorative" val="1"/>
@@ -11130,398 +12795,13 @@
             <a:schemeClr val="lt1"/>
           </a:fontRef>
         </p:style>
-        <p:txBody>
-          <a:bodyPr rtlCol="0" anchor="ctr"/>
-          <a:lstStyle/>
-          <a:p>
-            <a:pPr lvl="0" algn="ctr"/>
-            <a:endParaRPr lang="en-US"/>
-          </a:p>
-        </p:txBody>
-      </p:sp>
-      <p:sp>
-        <p:nvSpPr>
-          <p:cNvPr id="2" name="Title 1">
-            <a:extLst>
-              <a:ext uri="{FF2B5EF4-FFF2-40B4-BE49-F238E27FC236}">
-                <a16:creationId xmlns:a16="http://schemas.microsoft.com/office/drawing/2014/main" id="{3D382162-F66B-9BF5-9867-54B75C3C1B4E}"/>
-              </a:ext>
-            </a:extLst>
-          </p:cNvPr>
-          <p:cNvSpPr>
-            <a:spLocks noGrp="1"/>
-          </p:cNvSpPr>
-          <p:nvPr>
-            <p:ph type="title"/>
-          </p:nvPr>
-        </p:nvSpPr>
-        <p:spPr>
-          <a:xfrm>
-            <a:off x="860612" y="1138228"/>
-            <a:ext cx="3793685" cy="3858767"/>
-          </a:xfrm>
-        </p:spPr>
-        <p:txBody>
-          <a:bodyPr anchor="ctr">
-            <a:normAutofit/>
-          </a:bodyPr>
-          <a:lstStyle/>
-          <a:p>
-            <a:r>
-              <a:rPr lang="en-US" sz="3600"/>
-              <a:t>objective</a:t>
-            </a:r>
-            <a:endParaRPr lang="en-AU" sz="3600"/>
-          </a:p>
-        </p:txBody>
-      </p:sp>
-      <p:grpSp>
-        <p:nvGrpSpPr>
-          <p:cNvPr id="12" name="Group 11">
-            <a:extLst>
-              <a:ext uri="{FF2B5EF4-FFF2-40B4-BE49-F238E27FC236}">
-                <a16:creationId xmlns:a16="http://schemas.microsoft.com/office/drawing/2014/main" id="{357CA18A-A333-4DCB-842B-76827D2ECB24}"/>
-              </a:ext>
-              <a:ext uri="{C183D7F6-B498-43B3-948B-1728B52AA6E4}">
-                <adec:decorative xmlns:adec="http://schemas.microsoft.com/office/drawing/2017/decorative" val="1"/>
-              </a:ext>
-            </a:extLst>
-          </p:cNvPr>
-          <p:cNvGrpSpPr>
-            <a:grpSpLocks noGrp="1" noUngrp="1" noRot="1" noChangeAspect="1" noMove="1" noResize="1"/>
-          </p:cNvGrpSpPr>
-          <p:nvPr>
-            <p:extLst>
-              <p:ext uri="{386F3935-93C4-4BCD-93E2-E3B085C9AB24}">
-                <p16:designElem xmlns:p16="http://schemas.microsoft.com/office/powerpoint/2015/main" val="1"/>
-              </p:ext>
-            </p:extLst>
-          </p:nvPr>
-        </p:nvGrpSpPr>
-        <p:grpSpPr>
-          <a:xfrm>
-            <a:off x="5100021" y="638300"/>
-            <a:ext cx="6409605" cy="4858625"/>
-            <a:chOff x="7807230" y="2012810"/>
-            <a:chExt cx="3251252" cy="3459865"/>
-          </a:xfrm>
-        </p:grpSpPr>
-        <p:sp>
-          <p:nvSpPr>
-            <p:cNvPr id="13" name="Rectangle 12">
-              <a:extLst>
-                <a:ext uri="{FF2B5EF4-FFF2-40B4-BE49-F238E27FC236}">
-                  <a16:creationId xmlns:a16="http://schemas.microsoft.com/office/drawing/2014/main" id="{6E785FC3-CE7B-46F8-8C7A-EBBF001EDB17}"/>
-                </a:ext>
-                <a:ext uri="{C183D7F6-B498-43B3-948B-1728B52AA6E4}">
-                  <adec:decorative xmlns:adec="http://schemas.microsoft.com/office/drawing/2017/decorative" val="1"/>
-                </a:ext>
-              </a:extLst>
-            </p:cNvPr>
-            <p:cNvSpPr/>
-            <p:nvPr>
-              <p:extLst>
-                <p:ext uri="{386F3935-93C4-4BCD-93E2-E3B085C9AB24}">
-                  <p16:designElem xmlns:p16="http://schemas.microsoft.com/office/powerpoint/2015/main" val="1"/>
-                </p:ext>
-              </p:extLst>
-            </p:nvPr>
-          </p:nvSpPr>
-          <p:spPr>
-            <a:xfrm>
-              <a:off x="7807230" y="2012810"/>
-              <a:ext cx="3251252" cy="3459865"/>
-            </a:xfrm>
-            <a:prstGeom prst="rect">
-              <a:avLst/>
-            </a:prstGeom>
-            <a:gradFill>
-              <a:gsLst>
-                <a:gs pos="0">
-                  <a:srgbClr val="000001"/>
-                </a:gs>
-                <a:gs pos="100000">
-                  <a:srgbClr val="191919"/>
-                </a:gs>
-              </a:gsLst>
-            </a:gradFill>
-            <a:ln w="76200" cmpd="sng">
-              <a:noFill/>
-              <a:miter lim="800000"/>
-            </a:ln>
-            <a:effectLst>
-              <a:outerShdw blurRad="127000" dist="190500" dir="4740000" sx="98000" sy="98000" algn="tl" rotWithShape="0">
-                <a:srgbClr val="000000">
-                  <a:alpha val="34000"/>
-                </a:srgbClr>
-              </a:outerShdw>
-            </a:effectLst>
-            <a:scene3d>
-              <a:camera prst="orthographicFront"/>
-              <a:lightRig rig="threePt" dir="t"/>
-            </a:scene3d>
-            <a:sp3d>
-              <a:bevelT w="152400" h="50800" prst="softRound"/>
-            </a:sp3d>
-          </p:spPr>
-          <p:style>
-            <a:lnRef idx="1">
-              <a:schemeClr val="accent1"/>
-            </a:lnRef>
-            <a:fillRef idx="3">
-              <a:schemeClr val="accent1"/>
-            </a:fillRef>
-            <a:effectRef idx="2">
-              <a:schemeClr val="accent1"/>
-            </a:effectRef>
-            <a:fontRef idx="minor">
-              <a:schemeClr val="lt1"/>
-            </a:fontRef>
-          </p:style>
-          <p:txBody>
-            <a:bodyPr rtlCol="0" anchor="ctr"/>
-            <a:lstStyle/>
-            <a:p>
-              <a:pPr algn="ctr"/>
-              <a:endParaRPr lang="en-US"/>
-            </a:p>
-          </p:txBody>
-        </p:sp>
-        <p:sp>
-          <p:nvSpPr>
-            <p:cNvPr id="14" name="Rectangle 13">
-              <a:extLst>
-                <a:ext uri="{FF2B5EF4-FFF2-40B4-BE49-F238E27FC236}">
-                  <a16:creationId xmlns:a16="http://schemas.microsoft.com/office/drawing/2014/main" id="{75069D9A-30C7-4159-880C-DD2BDC51009B}"/>
-                </a:ext>
-                <a:ext uri="{C183D7F6-B498-43B3-948B-1728B52AA6E4}">
-                  <adec:decorative xmlns:adec="http://schemas.microsoft.com/office/drawing/2017/decorative" val="1"/>
-                </a:ext>
-              </a:extLst>
-            </p:cNvPr>
-            <p:cNvSpPr/>
-            <p:nvPr>
-              <p:extLst>
-                <p:ext uri="{386F3935-93C4-4BCD-93E2-E3B085C9AB24}">
-                  <p16:designElem xmlns:p16="http://schemas.microsoft.com/office/powerpoint/2015/main" val="1"/>
-                </p:ext>
-              </p:extLst>
-            </p:nvPr>
-          </p:nvSpPr>
-          <p:spPr>
-            <a:xfrm>
-              <a:off x="7807231" y="2026142"/>
-              <a:ext cx="3251250" cy="3440203"/>
-            </a:xfrm>
-            <a:prstGeom prst="rect">
-              <a:avLst/>
-            </a:prstGeom>
-            <a:gradFill>
-              <a:gsLst>
-                <a:gs pos="0">
-                  <a:srgbClr val="DADADA"/>
-                </a:gs>
-                <a:gs pos="100000">
-                  <a:srgbClr val="FFFFFE"/>
-                </a:gs>
-              </a:gsLst>
-              <a:lin ang="16200000" scaled="0"/>
-            </a:gradFill>
-            <a:ln w="76200" cmpd="sng">
-              <a:solidFill>
-                <a:srgbClr val="191919"/>
-              </a:solidFill>
-              <a:miter lim="800000"/>
-            </a:ln>
-            <a:effectLst>
-              <a:innerShdw blurRad="63500" dist="88900" dir="14100000">
-                <a:srgbClr val="000000">
-                  <a:alpha val="30000"/>
-                </a:srgbClr>
-              </a:innerShdw>
-            </a:effectLst>
-            <a:scene3d>
-              <a:camera prst="orthographicFront"/>
-              <a:lightRig rig="threePt" dir="t"/>
-            </a:scene3d>
-            <a:sp3d>
-              <a:bevelT w="38100" h="38100" prst="relaxedInset"/>
-            </a:sp3d>
-          </p:spPr>
-          <p:style>
-            <a:lnRef idx="1">
-              <a:schemeClr val="accent1"/>
-            </a:lnRef>
-            <a:fillRef idx="3">
-              <a:schemeClr val="accent1"/>
-            </a:fillRef>
-            <a:effectRef idx="2">
-              <a:schemeClr val="accent1"/>
-            </a:effectRef>
-            <a:fontRef idx="minor">
-              <a:schemeClr val="lt1"/>
-            </a:fontRef>
-          </p:style>
-          <p:txBody>
-            <a:bodyPr rtlCol="0" anchor="ctr"/>
-            <a:lstStyle/>
-            <a:p>
-              <a:pPr algn="ctr"/>
-              <a:endParaRPr lang="en-US"/>
-            </a:p>
-          </p:txBody>
-        </p:sp>
-      </p:grpSp>
-      <p:sp>
-        <p:nvSpPr>
-          <p:cNvPr id="16" name="Rectangle 15">
-            <a:extLst>
-              <a:ext uri="{FF2B5EF4-FFF2-40B4-BE49-F238E27FC236}">
-                <a16:creationId xmlns:a16="http://schemas.microsoft.com/office/drawing/2014/main" id="{D9FE1511-6E1B-4F0E-8FF0-958527181CC9}"/>
-              </a:ext>
-              <a:ext uri="{C183D7F6-B498-43B3-948B-1728B52AA6E4}">
-                <adec:decorative xmlns:adec="http://schemas.microsoft.com/office/drawing/2017/decorative" val="1"/>
-              </a:ext>
-            </a:extLst>
-          </p:cNvPr>
-          <p:cNvSpPr>
-            <a:spLocks noGrp="1" noRot="1" noChangeAspect="1" noMove="1" noResize="1" noEditPoints="1" noAdjustHandles="1" noChangeArrowheads="1" noChangeShapeType="1" noTextEdit="1"/>
-          </p:cNvSpPr>
-          <p:nvPr>
-            <p:extLst>
-              <p:ext uri="{386F3935-93C4-4BCD-93E2-E3B085C9AB24}">
-                <p16:designElem xmlns:p16="http://schemas.microsoft.com/office/powerpoint/2015/main" val="1"/>
-              </p:ext>
-            </p:extLst>
-          </p:nvPr>
-        </p:nvSpPr>
-        <p:spPr>
-          <a:xfrm>
-            <a:off x="5419891" y="973636"/>
-            <a:ext cx="5769864" cy="4187952"/>
-          </a:xfrm>
-          <a:prstGeom prst="rect">
-            <a:avLst/>
-          </a:prstGeom>
-          <a:solidFill>
-            <a:srgbClr val="FFFFFF"/>
-          </a:solidFill>
-          <a:ln w="6350">
-            <a:solidFill>
-              <a:srgbClr val="DFDBD5"/>
-            </a:solidFill>
-          </a:ln>
-        </p:spPr>
-        <p:style>
-          <a:lnRef idx="2">
-            <a:schemeClr val="accent1">
-              <a:shade val="50000"/>
-            </a:schemeClr>
-          </a:lnRef>
-          <a:fillRef idx="1">
-            <a:schemeClr val="accent1"/>
-          </a:fillRef>
-          <a:effectRef idx="0">
-            <a:schemeClr val="accent1"/>
-          </a:effectRef>
-          <a:fontRef idx="minor">
-            <a:schemeClr val="lt1"/>
-          </a:fontRef>
-        </p:style>
-        <p:txBody>
-          <a:bodyPr rtlCol="0" anchor="ctr"/>
-          <a:lstStyle/>
-          <a:p>
-            <a:pPr algn="ctr"/>
-            <a:endParaRPr lang="en-US"/>
-          </a:p>
-        </p:txBody>
-      </p:sp>
-      <p:sp>
-        <p:nvSpPr>
-          <p:cNvPr id="3" name="Content Placeholder 2">
-            <a:extLst>
-              <a:ext uri="{FF2B5EF4-FFF2-40B4-BE49-F238E27FC236}">
-                <a16:creationId xmlns:a16="http://schemas.microsoft.com/office/drawing/2014/main" id="{50EB7F42-1D17-E5BF-B407-3152C97FDCF7}"/>
-              </a:ext>
-            </a:extLst>
-          </p:cNvPr>
-          <p:cNvSpPr>
-            <a:spLocks noGrp="1"/>
-          </p:cNvSpPr>
-          <p:nvPr>
-            <p:ph idx="1"/>
-          </p:nvPr>
-        </p:nvSpPr>
-        <p:spPr>
-          <a:xfrm>
-            <a:off x="5584483" y="1138228"/>
-            <a:ext cx="5440680" cy="3858768"/>
-          </a:xfrm>
-        </p:spPr>
-        <p:txBody>
-          <a:bodyPr anchor="ctr">
-            <a:normAutofit/>
-          </a:bodyPr>
-          <a:lstStyle/>
-          <a:p>
-            <a:r>
-              <a:rPr lang="en-US" dirty="0">
-                <a:solidFill>
-                  <a:srgbClr val="000000"/>
-                </a:solidFill>
-                <a:latin typeface="Söhne"/>
-              </a:rPr>
-              <a:t>Clean, </a:t>
-            </a:r>
-            <a:r>
-              <a:rPr lang="en-US" b="0" i="0" dirty="0">
-                <a:solidFill>
-                  <a:srgbClr val="000000"/>
-                </a:solidFill>
-                <a:effectLst/>
-                <a:latin typeface="Söhne"/>
-              </a:rPr>
-              <a:t>preprocess and run exploratory analysis on Perth House Prices data.</a:t>
-            </a:r>
-          </a:p>
-          <a:p>
-            <a:r>
-              <a:rPr lang="en-US" b="0" i="0" dirty="0">
-                <a:solidFill>
-                  <a:srgbClr val="000000"/>
-                </a:solidFill>
-                <a:effectLst/>
-                <a:latin typeface="Söhne"/>
-              </a:rPr>
-              <a:t>Apply Machine Learning algorithms &amp; build a predictive model to estimate sale prices.</a:t>
-            </a:r>
-          </a:p>
-          <a:p>
-            <a:r>
-              <a:rPr lang="en-US" b="0" i="0" dirty="0">
-                <a:solidFill>
-                  <a:srgbClr val="000000"/>
-                </a:solidFill>
-                <a:effectLst/>
-                <a:latin typeface="Söhne"/>
-              </a:rPr>
-              <a:t>Visualize the Perth House Prices data using Tableau.</a:t>
-            </a:r>
-            <a:endParaRPr lang="en-AU" dirty="0">
-              <a:solidFill>
-                <a:srgbClr val="000000"/>
-              </a:solidFill>
-            </a:endParaRPr>
-          </a:p>
-        </p:txBody>
       </p:sp>
       <p:pic>
         <p:nvPicPr>
-          <p:cNvPr id="18" name="Picture 17">
+          <p:cNvPr id="27" name="Picture 26">
             <a:extLst>
               <a:ext uri="{FF2B5EF4-FFF2-40B4-BE49-F238E27FC236}">
-                <a16:creationId xmlns:a16="http://schemas.microsoft.com/office/drawing/2014/main" id="{025CEF6D-5E98-4B5C-A10F-7459C1EEF10E}"/>
+                <a16:creationId xmlns:a16="http://schemas.microsoft.com/office/drawing/2014/main" id="{C2192E09-EBC7-416C-B887-DFF915D7F43D}"/>
               </a:ext>
               <a:ext uri="{C183D7F6-B498-43B3-948B-1728B52AA6E4}">
                 <adec:decorative xmlns:adec="http://schemas.microsoft.com/office/drawing/2017/decorative" val="1"/>
@@ -11562,10 +12842,588 @@
       </p:pic>
       <p:cxnSp>
         <p:nvCxnSpPr>
-          <p:cNvPr id="20" name="Straight Connector 19">
+          <p:cNvPr id="29" name="Straight Connector 28">
             <a:extLst>
               <a:ext uri="{FF2B5EF4-FFF2-40B4-BE49-F238E27FC236}">
-                <a16:creationId xmlns:a16="http://schemas.microsoft.com/office/drawing/2014/main" id="{05C73161-1E4E-4E6A-91B2-E885CF8FFBA6}"/>
+                <a16:creationId xmlns:a16="http://schemas.microsoft.com/office/drawing/2014/main" id="{2924498D-E084-44BE-A196-CFCE35564350}"/>
+              </a:ext>
+              <a:ext uri="{C183D7F6-B498-43B3-948B-1728B52AA6E4}">
+                <adec:decorative xmlns:adec="http://schemas.microsoft.com/office/drawing/2017/decorative" val="1"/>
+              </a:ext>
+            </a:extLst>
+          </p:cNvPr>
+          <p:cNvCxnSpPr>
+            <a:cxnSpLocks noGrp="1" noRot="1" noChangeAspect="1" noMove="1" noResize="1" noEditPoints="1" noAdjustHandles="1" noChangeArrowheads="1" noChangeShapeType="1"/>
+          </p:cNvCxnSpPr>
+          <p:nvPr>
+            <p:extLst>
+              <p:ext uri="{386F3935-93C4-4BCD-93E2-E3B085C9AB24}">
+                <p16:designElem xmlns:p16="http://schemas.microsoft.com/office/powerpoint/2015/main" val="1"/>
+              </p:ext>
+            </p:extLst>
+          </p:nvPr>
+        </p:nvCxnSpPr>
+        <p:spPr>
+          <a:xfrm>
+            <a:off x="0" y="6128413"/>
+            <a:ext cx="12192000" cy="0"/>
+          </a:xfrm>
+          <a:prstGeom prst="line">
+            <a:avLst/>
+          </a:prstGeom>
+          <a:ln w="12700">
+            <a:solidFill>
+              <a:srgbClr val="000001">
+                <a:alpha val="20000"/>
+              </a:srgbClr>
+            </a:solidFill>
+          </a:ln>
+        </p:spPr>
+        <p:style>
+          <a:lnRef idx="1">
+            <a:schemeClr val="accent1"/>
+          </a:lnRef>
+          <a:fillRef idx="0">
+            <a:schemeClr val="accent1"/>
+          </a:fillRef>
+          <a:effectRef idx="0">
+            <a:schemeClr val="accent1"/>
+          </a:effectRef>
+          <a:fontRef idx="minor">
+            <a:schemeClr val="tx1"/>
+          </a:fontRef>
+        </p:style>
+      </p:cxnSp>
+      <p:cxnSp>
+        <p:nvCxnSpPr>
+          <p:cNvPr id="31" name="Straight Connector 30">
+            <a:extLst>
+              <a:ext uri="{FF2B5EF4-FFF2-40B4-BE49-F238E27FC236}">
+                <a16:creationId xmlns:a16="http://schemas.microsoft.com/office/drawing/2014/main" id="{3BBC7667-C352-4842-9AFD-E5C16AD002F4}"/>
+              </a:ext>
+              <a:ext uri="{C183D7F6-B498-43B3-948B-1728B52AA6E4}">
+                <adec:decorative xmlns:adec="http://schemas.microsoft.com/office/drawing/2017/decorative" val="1"/>
+              </a:ext>
+            </a:extLst>
+          </p:cNvPr>
+          <p:cNvCxnSpPr>
+            <a:cxnSpLocks noGrp="1" noRot="1" noChangeAspect="1" noMove="1" noResize="1" noEditPoints="1" noAdjustHandles="1" noChangeArrowheads="1" noChangeShapeType="1"/>
+          </p:cNvCxnSpPr>
+          <p:nvPr>
+            <p:extLst>
+              <p:ext uri="{386F3935-93C4-4BCD-93E2-E3B085C9AB24}">
+                <p16:designElem xmlns:p16="http://schemas.microsoft.com/office/powerpoint/2015/main" val="1"/>
+              </p:ext>
+            </p:extLst>
+          </p:nvPr>
+        </p:nvCxnSpPr>
+        <p:spPr>
+          <a:xfrm>
+            <a:off x="2417780" y="3528542"/>
+            <a:ext cx="8637072" cy="0"/>
+          </a:xfrm>
+          <a:prstGeom prst="line">
+            <a:avLst/>
+          </a:prstGeom>
+          <a:ln w="31750"/>
+        </p:spPr>
+        <p:style>
+          <a:lnRef idx="3">
+            <a:schemeClr val="accent1"/>
+          </a:lnRef>
+          <a:fillRef idx="0">
+            <a:schemeClr val="accent1"/>
+          </a:fillRef>
+          <a:effectRef idx="2">
+            <a:schemeClr val="accent1"/>
+          </a:effectRef>
+          <a:fontRef idx="minor">
+            <a:schemeClr val="tx1"/>
+          </a:fontRef>
+        </p:style>
+      </p:cxnSp>
+      <p:sp useBgFill="1">
+        <p:nvSpPr>
+          <p:cNvPr id="33" name="Rectangle 32">
+            <a:extLst>
+              <a:ext uri="{FF2B5EF4-FFF2-40B4-BE49-F238E27FC236}">
+                <a16:creationId xmlns:a16="http://schemas.microsoft.com/office/drawing/2014/main" id="{1C69834E-5EEE-4D61-833E-04928896454C}"/>
+              </a:ext>
+              <a:ext uri="{C183D7F6-B498-43B3-948B-1728B52AA6E4}">
+                <adec:decorative xmlns:adec="http://schemas.microsoft.com/office/drawing/2017/decorative" val="1"/>
+              </a:ext>
+            </a:extLst>
+          </p:cNvPr>
+          <p:cNvSpPr>
+            <a:spLocks noGrp="1" noRot="1" noChangeAspect="1" noMove="1" noResize="1" noEditPoints="1" noAdjustHandles="1" noChangeArrowheads="1" noChangeShapeType="1" noTextEdit="1"/>
+          </p:cNvSpPr>
+          <p:nvPr>
+            <p:extLst>
+              <p:ext uri="{386F3935-93C4-4BCD-93E2-E3B085C9AB24}">
+                <p16:designElem xmlns:p16="http://schemas.microsoft.com/office/powerpoint/2015/main" val="1"/>
+              </p:ext>
+            </p:extLst>
+          </p:nvPr>
+        </p:nvSpPr>
+        <p:spPr>
+          <a:xfrm>
+            <a:off x="2" y="0"/>
+            <a:ext cx="12191695" cy="6858000"/>
+          </a:xfrm>
+          <a:prstGeom prst="rect">
+            <a:avLst/>
+          </a:prstGeom>
+          <a:ln>
+            <a:noFill/>
+          </a:ln>
+        </p:spPr>
+        <p:style>
+          <a:lnRef idx="2">
+            <a:schemeClr val="accent1">
+              <a:shade val="50000"/>
+            </a:schemeClr>
+          </a:lnRef>
+          <a:fillRef idx="1">
+            <a:schemeClr val="accent1"/>
+          </a:fillRef>
+          <a:effectRef idx="0">
+            <a:schemeClr val="accent1"/>
+          </a:effectRef>
+          <a:fontRef idx="minor">
+            <a:schemeClr val="lt1"/>
+          </a:fontRef>
+        </p:style>
+        <p:txBody>
+          <a:bodyPr rtlCol="0" anchor="ctr"/>
+          <a:lstStyle/>
+          <a:p>
+            <a:pPr algn="ctr"/>
+            <a:endParaRPr lang="en-US"/>
+          </a:p>
+        </p:txBody>
+      </p:sp>
+      <p:sp>
+        <p:nvSpPr>
+          <p:cNvPr id="35" name="Rectangle 34">
+            <a:extLst>
+              <a:ext uri="{FF2B5EF4-FFF2-40B4-BE49-F238E27FC236}">
+                <a16:creationId xmlns:a16="http://schemas.microsoft.com/office/drawing/2014/main" id="{58E5D9BA-46E7-4BFA-9C74-75495BF6F54D}"/>
+              </a:ext>
+              <a:ext uri="{C183D7F6-B498-43B3-948B-1728B52AA6E4}">
+                <adec:decorative xmlns:adec="http://schemas.microsoft.com/office/drawing/2017/decorative" val="1"/>
+              </a:ext>
+            </a:extLst>
+          </p:cNvPr>
+          <p:cNvSpPr>
+            <a:spLocks noGrp="1" noRot="1" noChangeAspect="1" noMove="1" noResize="1" noEditPoints="1" noAdjustHandles="1" noChangeArrowheads="1" noChangeShapeType="1" noTextEdit="1"/>
+          </p:cNvSpPr>
+          <p:nvPr>
+            <p:extLst>
+              <p:ext uri="{386F3935-93C4-4BCD-93E2-E3B085C9AB24}">
+                <p16:designElem xmlns:p16="http://schemas.microsoft.com/office/powerpoint/2015/main" val="1"/>
+              </p:ext>
+            </p:extLst>
+          </p:nvPr>
+        </p:nvSpPr>
+        <p:spPr>
+          <a:xfrm>
+            <a:off x="0" y="2019476"/>
+            <a:ext cx="12192000" cy="4105941"/>
+          </a:xfrm>
+          <a:prstGeom prst="rect">
+            <a:avLst/>
+          </a:prstGeom>
+          <a:gradFill flip="none" rotWithShape="1">
+            <a:gsLst>
+              <a:gs pos="0">
+                <a:schemeClr val="bg2">
+                  <a:alpha val="0"/>
+                </a:schemeClr>
+              </a:gs>
+              <a:gs pos="100000">
+                <a:schemeClr val="bg2"/>
+              </a:gs>
+            </a:gsLst>
+            <a:lin ang="5400000" scaled="0"/>
+            <a:tileRect/>
+          </a:gradFill>
+          <a:ln>
+            <a:noFill/>
+          </a:ln>
+        </p:spPr>
+        <p:style>
+          <a:lnRef idx="2">
+            <a:schemeClr val="accent1">
+              <a:shade val="50000"/>
+            </a:schemeClr>
+          </a:lnRef>
+          <a:fillRef idx="1">
+            <a:schemeClr val="accent1"/>
+          </a:fillRef>
+          <a:effectRef idx="0">
+            <a:schemeClr val="accent1"/>
+          </a:effectRef>
+          <a:fontRef idx="minor">
+            <a:schemeClr val="lt1"/>
+          </a:fontRef>
+        </p:style>
+        <p:txBody>
+          <a:bodyPr rtlCol="0" anchor="ctr"/>
+          <a:lstStyle/>
+          <a:p>
+            <a:pPr lvl="0" algn="ctr"/>
+            <a:endParaRPr lang="en-US"/>
+          </a:p>
+        </p:txBody>
+      </p:sp>
+      <p:sp>
+        <p:nvSpPr>
+          <p:cNvPr id="37" name="Rectangle 36">
+            <a:extLst>
+              <a:ext uri="{FF2B5EF4-FFF2-40B4-BE49-F238E27FC236}">
+                <a16:creationId xmlns:a16="http://schemas.microsoft.com/office/drawing/2014/main" id="{5B033D76-5800-44B6-AFE9-EE2106935115}"/>
+              </a:ext>
+              <a:ext uri="{C183D7F6-B498-43B3-948B-1728B52AA6E4}">
+                <adec:decorative xmlns:adec="http://schemas.microsoft.com/office/drawing/2017/decorative" val="1"/>
+              </a:ext>
+            </a:extLst>
+          </p:cNvPr>
+          <p:cNvSpPr>
+            <a:spLocks noGrp="1" noRot="1" noChangeAspect="1" noMove="1" noResize="1" noEditPoints="1" noAdjustHandles="1" noChangeArrowheads="1" noChangeShapeType="1" noTextEdit="1"/>
+          </p:cNvSpPr>
+          <p:nvPr>
+            <p:extLst>
+              <p:ext uri="{386F3935-93C4-4BCD-93E2-E3B085C9AB24}">
+                <p16:designElem xmlns:p16="http://schemas.microsoft.com/office/powerpoint/2015/main" val="1"/>
+              </p:ext>
+            </p:extLst>
+          </p:nvPr>
+        </p:nvSpPr>
+        <p:spPr>
+          <a:xfrm>
+            <a:off x="643331" y="638508"/>
+            <a:ext cx="10905339" cy="4843439"/>
+          </a:xfrm>
+          <a:prstGeom prst="rect">
+            <a:avLst/>
+          </a:prstGeom>
+          <a:gradFill>
+            <a:gsLst>
+              <a:gs pos="0">
+                <a:srgbClr val="000001"/>
+              </a:gs>
+              <a:gs pos="100000">
+                <a:srgbClr val="191919"/>
+              </a:gs>
+            </a:gsLst>
+          </a:gradFill>
+          <a:ln w="76200" cmpd="sng">
+            <a:noFill/>
+            <a:miter lim="800000"/>
+          </a:ln>
+          <a:effectLst>
+            <a:outerShdw blurRad="127000" dist="228600" dir="4740000" sx="98000" sy="98000" algn="tl" rotWithShape="0">
+              <a:srgbClr val="000000">
+                <a:alpha val="34000"/>
+              </a:srgbClr>
+            </a:outerShdw>
+          </a:effectLst>
+          <a:scene3d>
+            <a:camera prst="orthographicFront"/>
+            <a:lightRig rig="threePt" dir="t"/>
+          </a:scene3d>
+          <a:sp3d>
+            <a:bevelT w="152400" h="50800" prst="softRound"/>
+          </a:sp3d>
+        </p:spPr>
+        <p:style>
+          <a:lnRef idx="1">
+            <a:schemeClr val="accent1"/>
+          </a:lnRef>
+          <a:fillRef idx="3">
+            <a:schemeClr val="accent1"/>
+          </a:fillRef>
+          <a:effectRef idx="2">
+            <a:schemeClr val="accent1"/>
+          </a:effectRef>
+          <a:fontRef idx="minor">
+            <a:schemeClr val="lt1"/>
+          </a:fontRef>
+        </p:style>
+        <p:txBody>
+          <a:bodyPr rtlCol="0" anchor="ctr"/>
+          <a:lstStyle/>
+          <a:p>
+            <a:pPr algn="ctr"/>
+            <a:endParaRPr lang="en-US"/>
+          </a:p>
+        </p:txBody>
+      </p:sp>
+      <p:sp>
+        <p:nvSpPr>
+          <p:cNvPr id="39" name="Rectangle 38">
+            <a:extLst>
+              <a:ext uri="{FF2B5EF4-FFF2-40B4-BE49-F238E27FC236}">
+                <a16:creationId xmlns:a16="http://schemas.microsoft.com/office/drawing/2014/main" id="{522D6F85-FFBA-4F81-AEE5-AAA17CB7AA98}"/>
+              </a:ext>
+              <a:ext uri="{C183D7F6-B498-43B3-948B-1728B52AA6E4}">
+                <adec:decorative xmlns:adec="http://schemas.microsoft.com/office/drawing/2017/decorative" val="1"/>
+              </a:ext>
+            </a:extLst>
+          </p:cNvPr>
+          <p:cNvSpPr>
+            <a:spLocks noGrp="1" noRot="1" noChangeAspect="1" noMove="1" noResize="1" noEditPoints="1" noAdjustHandles="1" noChangeArrowheads="1" noChangeShapeType="1" noTextEdit="1"/>
+          </p:cNvSpPr>
+          <p:nvPr>
+            <p:extLst>
+              <p:ext uri="{386F3935-93C4-4BCD-93E2-E3B085C9AB24}">
+                <p16:designElem xmlns:p16="http://schemas.microsoft.com/office/powerpoint/2015/main" val="1"/>
+              </p:ext>
+            </p:extLst>
+          </p:nvPr>
+        </p:nvSpPr>
+        <p:spPr>
+          <a:xfrm>
+            <a:off x="870204" y="865667"/>
+            <a:ext cx="10451592" cy="4389120"/>
+          </a:xfrm>
+          <a:prstGeom prst="rect">
+            <a:avLst/>
+          </a:prstGeom>
+          <a:ln w="50800" cmpd="sng">
+            <a:solidFill>
+              <a:srgbClr val="191919"/>
+            </a:solidFill>
+            <a:miter lim="800000"/>
+          </a:ln>
+          <a:effectLst>
+            <a:innerShdw blurRad="63500" dist="88900" dir="14100000">
+              <a:srgbClr val="000000">
+                <a:alpha val="30000"/>
+              </a:srgbClr>
+            </a:innerShdw>
+          </a:effectLst>
+          <a:scene3d>
+            <a:camera prst="orthographicFront"/>
+            <a:lightRig rig="threePt" dir="t"/>
+          </a:scene3d>
+          <a:sp3d>
+            <a:bevelT prst="relaxedInset"/>
+          </a:sp3d>
+        </p:spPr>
+        <p:style>
+          <a:lnRef idx="1">
+            <a:schemeClr val="accent1"/>
+          </a:lnRef>
+          <a:fillRef idx="1003">
+            <a:schemeClr val="dk2"/>
+          </a:fillRef>
+          <a:effectRef idx="2">
+            <a:schemeClr val="accent1"/>
+          </a:effectRef>
+          <a:fontRef idx="minor">
+            <a:schemeClr val="lt1"/>
+          </a:fontRef>
+        </p:style>
+        <p:txBody>
+          <a:bodyPr rtlCol="0" anchor="ctr"/>
+          <a:lstStyle/>
+          <a:p>
+            <a:pPr algn="ctr"/>
+            <a:endParaRPr lang="en-US"/>
+          </a:p>
+        </p:txBody>
+      </p:sp>
+      <p:sp>
+        <p:nvSpPr>
+          <p:cNvPr id="41" name="Rectangle 40">
+            <a:extLst>
+              <a:ext uri="{FF2B5EF4-FFF2-40B4-BE49-F238E27FC236}">
+                <a16:creationId xmlns:a16="http://schemas.microsoft.com/office/drawing/2014/main" id="{13B31514-E6DF-4357-9EEA-EFB7983080DA}"/>
+              </a:ext>
+              <a:ext uri="{C183D7F6-B498-43B3-948B-1728B52AA6E4}">
+                <adec:decorative xmlns:adec="http://schemas.microsoft.com/office/drawing/2017/decorative" val="1"/>
+              </a:ext>
+            </a:extLst>
+          </p:cNvPr>
+          <p:cNvSpPr>
+            <a:spLocks noGrp="1" noRot="1" noChangeAspect="1" noMove="1" noResize="1" noEditPoints="1" noAdjustHandles="1" noChangeArrowheads="1" noChangeShapeType="1" noTextEdit="1"/>
+          </p:cNvSpPr>
+          <p:nvPr>
+            <p:extLst>
+              <p:ext uri="{386F3935-93C4-4BCD-93E2-E3B085C9AB24}">
+                <p16:designElem xmlns:p16="http://schemas.microsoft.com/office/powerpoint/2015/main" val="1"/>
+              </p:ext>
+            </p:extLst>
+          </p:nvPr>
+        </p:nvSpPr>
+        <p:spPr>
+          <a:xfrm>
+            <a:off x="1034796" y="1030259"/>
+            <a:ext cx="10122408" cy="4059936"/>
+          </a:xfrm>
+          <a:prstGeom prst="rect">
+            <a:avLst/>
+          </a:prstGeom>
+          <a:ln>
+            <a:solidFill>
+              <a:srgbClr val="949494"/>
+            </a:solidFill>
+          </a:ln>
+        </p:spPr>
+        <p:style>
+          <a:lnRef idx="2">
+            <a:schemeClr val="accent1">
+              <a:shade val="50000"/>
+            </a:schemeClr>
+          </a:lnRef>
+          <a:fillRef idx="1003">
+            <a:schemeClr val="lt1"/>
+          </a:fillRef>
+          <a:effectRef idx="0">
+            <a:schemeClr val="accent1"/>
+          </a:effectRef>
+          <a:fontRef idx="minor">
+            <a:schemeClr val="lt1"/>
+          </a:fontRef>
+        </p:style>
+        <p:txBody>
+          <a:bodyPr rtlCol="0" anchor="ctr"/>
+          <a:lstStyle/>
+          <a:p>
+            <a:pPr algn="ctr"/>
+            <a:endParaRPr lang="en-US"/>
+          </a:p>
+        </p:txBody>
+      </p:sp>
+      <p:sp>
+        <p:nvSpPr>
+          <p:cNvPr id="2" name="Title 1">
+            <a:extLst>
+              <a:ext uri="{FF2B5EF4-FFF2-40B4-BE49-F238E27FC236}">
+                <a16:creationId xmlns:a16="http://schemas.microsoft.com/office/drawing/2014/main" id="{3D382162-F66B-9BF5-9867-54B75C3C1B4E}"/>
+              </a:ext>
+            </a:extLst>
+          </p:cNvPr>
+          <p:cNvSpPr>
+            <a:spLocks noGrp="1"/>
+          </p:cNvSpPr>
+          <p:nvPr>
+            <p:ph type="title"/>
+          </p:nvPr>
+        </p:nvSpPr>
+        <p:spPr>
+          <a:xfrm>
+            <a:off x="1557071" y="1584552"/>
+            <a:ext cx="9099255" cy="2537251"/>
+          </a:xfrm>
+        </p:spPr>
+        <p:txBody>
+          <a:bodyPr vert="horz" lIns="91440" tIns="45720" rIns="91440" bIns="0" rtlCol="0" anchor="ctr">
+            <a:normAutofit/>
+          </a:bodyPr>
+          <a:lstStyle/>
+          <a:p>
+            <a:pPr algn="ctr"/>
+            <a:r>
+              <a:rPr lang="en-US" sz="7200" dirty="0">
+                <a:solidFill>
+                  <a:srgbClr val="454545"/>
+                </a:solidFill>
+              </a:rPr>
+              <a:t>objective</a:t>
+            </a:r>
+          </a:p>
+        </p:txBody>
+      </p:sp>
+      <p:sp>
+        <p:nvSpPr>
+          <p:cNvPr id="3" name="Content Placeholder 2">
+            <a:extLst>
+              <a:ext uri="{FF2B5EF4-FFF2-40B4-BE49-F238E27FC236}">
+                <a16:creationId xmlns:a16="http://schemas.microsoft.com/office/drawing/2014/main" id="{50EB7F42-1D17-E5BF-B407-3152C97FDCF7}"/>
+              </a:ext>
+            </a:extLst>
+          </p:cNvPr>
+          <p:cNvSpPr>
+            <a:spLocks noGrp="1"/>
+          </p:cNvSpPr>
+          <p:nvPr>
+            <p:ph idx="1"/>
+          </p:nvPr>
+        </p:nvSpPr>
+        <p:spPr>
+          <a:xfrm>
+            <a:off x="1535372" y="4133234"/>
+            <a:ext cx="9120954" cy="744373"/>
+          </a:xfrm>
+        </p:spPr>
+        <p:txBody>
+          <a:bodyPr vert="horz" lIns="91440" tIns="91440" rIns="91440" bIns="91440" rtlCol="0">
+            <a:normAutofit fontScale="92500"/>
+          </a:bodyPr>
+          <a:lstStyle/>
+          <a:p>
+            <a:pPr marL="0" indent="0" algn="ctr">
+              <a:buNone/>
+            </a:pPr>
+            <a:r>
+              <a:rPr lang="en-US" sz="1800" cap="all" dirty="0"/>
+              <a:t>Create a machine learning model that will successfully predict house prices</a:t>
+            </a:r>
+          </a:p>
+        </p:txBody>
+      </p:sp>
+      <p:pic>
+        <p:nvPicPr>
+          <p:cNvPr id="43" name="Picture 42">
+            <a:extLst>
+              <a:ext uri="{FF2B5EF4-FFF2-40B4-BE49-F238E27FC236}">
+                <a16:creationId xmlns:a16="http://schemas.microsoft.com/office/drawing/2014/main" id="{4C401D57-600A-4C91-AC9A-14CA1ED6F7D8}"/>
+              </a:ext>
+              <a:ext uri="{C183D7F6-B498-43B3-948B-1728B52AA6E4}">
+                <adec:decorative xmlns:adec="http://schemas.microsoft.com/office/drawing/2017/decorative" val="1"/>
+              </a:ext>
+            </a:extLst>
+          </p:cNvPr>
+          <p:cNvPicPr>
+            <a:picLocks noGrp="1" noRot="1" noChangeAspect="1" noMove="1" noResize="1" noEditPoints="1" noAdjustHandles="1" noChangeArrowheads="1" noChangeShapeType="1" noCrop="1"/>
+          </p:cNvPicPr>
+          <p:nvPr>
+            <p:extLst>
+              <p:ext uri="{386F3935-93C4-4BCD-93E2-E3B085C9AB24}">
+                <p16:designElem xmlns:p16="http://schemas.microsoft.com/office/powerpoint/2015/main" val="1"/>
+              </p:ext>
+            </p:extLst>
+          </p:nvPr>
+        </p:nvPicPr>
+        <p:blipFill rotWithShape="1">
+          <a:blip r:embed="rId2">
+            <a:extLst>
+              <a:ext uri="{28A0092B-C50C-407E-A947-70E740481C1C}">
+                <a14:useLocalDpi xmlns:a14="http://schemas.microsoft.com/office/drawing/2010/main" val="0"/>
+              </a:ext>
+            </a:extLst>
+          </a:blip>
+          <a:srcRect t="1538" b="-1538"/>
+          <a:stretch/>
+        </p:blipFill>
+        <p:spPr bwMode="black">
+          <a:xfrm>
+            <a:off x="0" y="6126480"/>
+            <a:ext cx="12192000" cy="742950"/>
+          </a:xfrm>
+          <a:prstGeom prst="rect">
+            <a:avLst/>
+          </a:prstGeom>
+        </p:spPr>
+      </p:pic>
+      <p:cxnSp>
+        <p:nvCxnSpPr>
+          <p:cNvPr id="45" name="Straight Connector 44">
+            <a:extLst>
+              <a:ext uri="{FF2B5EF4-FFF2-40B4-BE49-F238E27FC236}">
+                <a16:creationId xmlns:a16="http://schemas.microsoft.com/office/drawing/2014/main" id="{412BDC66-00FA-4A3F-9BC7-BE05FF7705F8}"/>
               </a:ext>
               <a:ext uri="{C183D7F6-B498-43B3-948B-1728B52AA6E4}">
                 <adec:decorative xmlns:adec="http://schemas.microsoft.com/office/drawing/2017/decorative" val="1"/>
@@ -12099,36 +13957,6 @@
       </p:sp>
       <p:pic>
         <p:nvPicPr>
-          <p:cNvPr id="17" name="Picture 16" descr="A screenshot of a computer&#10;&#10;Description automatically generated">
-            <a:extLst>
-              <a:ext uri="{FF2B5EF4-FFF2-40B4-BE49-F238E27FC236}">
-                <a16:creationId xmlns:a16="http://schemas.microsoft.com/office/drawing/2014/main" id="{C7B32752-5D2E-FB7A-4E2F-9A8F29D31FD5}"/>
-              </a:ext>
-            </a:extLst>
-          </p:cNvPr>
-          <p:cNvPicPr>
-            <a:picLocks noChangeAspect="1"/>
-          </p:cNvPicPr>
-          <p:nvPr/>
-        </p:nvPicPr>
-        <p:blipFill>
-          <a:blip r:embed="rId4"/>
-          <a:stretch>
-            <a:fillRect/>
-          </a:stretch>
-        </p:blipFill>
-        <p:spPr>
-          <a:xfrm>
-            <a:off x="6454769" y="805583"/>
-            <a:ext cx="4239726" cy="4660762"/>
-          </a:xfrm>
-          <a:prstGeom prst="rect">
-            <a:avLst/>
-          </a:prstGeom>
-        </p:spPr>
-      </p:pic>
-      <p:pic>
-        <p:nvPicPr>
           <p:cNvPr id="47" name="Picture 35">
             <a:extLst>
               <a:ext uri="{FF2B5EF4-FFF2-40B4-BE49-F238E27FC236}">
@@ -12252,10 +14080,40 @@
         </p:xfrm>
         <a:graphic>
           <a:graphicData uri="http://schemas.openxmlformats.org/drawingml/2006/diagram">
-            <dgm:relIds xmlns:dgm="http://schemas.openxmlformats.org/drawingml/2006/diagram" xmlns:r="http://schemas.openxmlformats.org/officeDocument/2006/relationships" r:dm="rId5" r:lo="rId6" r:qs="rId7" r:cs="rId8"/>
+            <dgm:relIds xmlns:dgm="http://schemas.openxmlformats.org/drawingml/2006/diagram" xmlns:r="http://schemas.openxmlformats.org/officeDocument/2006/relationships" r:dm="rId4" r:lo="rId5" r:qs="rId6" r:cs="rId7"/>
           </a:graphicData>
         </a:graphic>
       </p:graphicFrame>
+      <p:pic>
+        <p:nvPicPr>
+          <p:cNvPr id="4" name="Picture 3" descr="A screenshot of a computer program&#10;&#10;Description automatically generated with medium confidence">
+            <a:extLst>
+              <a:ext uri="{FF2B5EF4-FFF2-40B4-BE49-F238E27FC236}">
+                <a16:creationId xmlns:a16="http://schemas.microsoft.com/office/drawing/2014/main" id="{66347AE0-027B-4EB7-35F8-309408A52B8E}"/>
+              </a:ext>
+            </a:extLst>
+          </p:cNvPr>
+          <p:cNvPicPr>
+            <a:picLocks noChangeAspect="1"/>
+          </p:cNvPicPr>
+          <p:nvPr/>
+        </p:nvPicPr>
+        <p:blipFill>
+          <a:blip r:embed="rId9"/>
+          <a:stretch>
+            <a:fillRect/>
+          </a:stretch>
+        </p:blipFill>
+        <p:spPr>
+          <a:xfrm>
+            <a:off x="7293273" y="556642"/>
+            <a:ext cx="4177373" cy="4909703"/>
+          </a:xfrm>
+          <a:prstGeom prst="rect">
+            <a:avLst/>
+          </a:prstGeom>
+        </p:spPr>
+      </p:pic>
     </p:spTree>
     <p:extLst>
       <p:ext uri="{BB962C8B-B14F-4D97-AF65-F5344CB8AC3E}">
@@ -12890,36 +14748,6 @@
       </p:grpSp>
       <p:pic>
         <p:nvPicPr>
-          <p:cNvPr id="9" name="Picture 8" descr="A picture containing text, diagram, plan, schematic&#10;&#10;Description automatically generated">
-            <a:extLst>
-              <a:ext uri="{FF2B5EF4-FFF2-40B4-BE49-F238E27FC236}">
-                <a16:creationId xmlns:a16="http://schemas.microsoft.com/office/drawing/2014/main" id="{8560A846-8C81-D729-C179-99B0E137F301}"/>
-              </a:ext>
-            </a:extLst>
-          </p:cNvPr>
-          <p:cNvPicPr>
-            <a:picLocks noChangeAspect="1"/>
-          </p:cNvPicPr>
-          <p:nvPr/>
-        </p:nvPicPr>
-        <p:blipFill>
-          <a:blip r:embed="rId4"/>
-          <a:stretch>
-            <a:fillRect/>
-          </a:stretch>
-        </p:blipFill>
-        <p:spPr>
-          <a:xfrm>
-            <a:off x="4978400" y="907728"/>
-            <a:ext cx="5502505" cy="4236928"/>
-          </a:xfrm>
-          <a:prstGeom prst="rect">
-            <a:avLst/>
-          </a:prstGeom>
-        </p:spPr>
-      </p:pic>
-      <p:pic>
-        <p:nvPicPr>
           <p:cNvPr id="78" name="Picture 77">
             <a:extLst>
               <a:ext uri="{FF2B5EF4-FFF2-40B4-BE49-F238E27FC236}">
@@ -13016,6 +14844,36 @@
           </a:fontRef>
         </p:style>
       </p:cxnSp>
+      <p:pic>
+        <p:nvPicPr>
+          <p:cNvPr id="6" name="Picture 5" descr="A picture containing text, diagram, plan, line&#10;&#10;Description automatically generated">
+            <a:extLst>
+              <a:ext uri="{FF2B5EF4-FFF2-40B4-BE49-F238E27FC236}">
+                <a16:creationId xmlns:a16="http://schemas.microsoft.com/office/drawing/2014/main" id="{6E7C3288-EC52-F1DE-951E-DE845B6F370D}"/>
+              </a:ext>
+            </a:extLst>
+          </p:cNvPr>
+          <p:cNvPicPr>
+            <a:picLocks noChangeAspect="1"/>
+          </p:cNvPicPr>
+          <p:nvPr/>
+        </p:nvPicPr>
+        <p:blipFill>
+          <a:blip r:embed="rId4"/>
+          <a:stretch>
+            <a:fillRect/>
+          </a:stretch>
+        </p:blipFill>
+        <p:spPr>
+          <a:xfrm>
+            <a:off x="5046544" y="881113"/>
+            <a:ext cx="5420084" cy="4227787"/>
+          </a:xfrm>
+          <a:prstGeom prst="rect">
+            <a:avLst/>
+          </a:prstGeom>
+        </p:spPr>
+      </p:pic>
     </p:spTree>
     <p:extLst>
       <p:ext uri="{BB962C8B-B14F-4D97-AF65-F5344CB8AC3E}">
@@ -13318,10 +15176,34 @@
           <a:p>
             <a:r>
               <a:rPr lang="en-US" dirty="0"/>
-              <a:t>One-hot encoded the Suburb, Nearest_stn and Nearest_sch columns</a:t>
+              <a:t>get_dummies was then used on the following </a:t>
             </a:r>
           </a:p>
           <a:p>
+            <a:pPr lvl="1"/>
+            <a:r>
+              <a:rPr lang="en-US" dirty="0"/>
+              <a:t>Suburb </a:t>
+            </a:r>
+          </a:p>
+          <a:p>
+            <a:pPr lvl="1"/>
+            <a:r>
+              <a:rPr lang="en-US" dirty="0"/>
+              <a:t>Nearest_stn </a:t>
+            </a:r>
+          </a:p>
+          <a:p>
+            <a:pPr lvl="1"/>
+            <a:r>
+              <a:rPr lang="en-US" dirty="0"/>
+              <a:t>Nearest_sch</a:t>
+            </a:r>
+          </a:p>
+          <a:p>
+            <a:pPr marL="0" indent="0">
+              <a:buNone/>
+            </a:pPr>
             <a:endParaRPr lang="en-AU" dirty="0"/>
           </a:p>
         </p:txBody>
@@ -13603,7 +15485,7 @@
           <p:nvPr/>
         </p:nvPicPr>
         <p:blipFill>
-          <a:blip r:embed="rId2"/>
+          <a:blip r:embed="rId3"/>
           <a:stretch>
             <a:fillRect/>
           </a:stretch>
@@ -13642,7 +15524,7 @@
           </p:nvPr>
         </p:nvPicPr>
         <p:blipFill rotWithShape="1">
-          <a:blip r:embed="rId3">
+          <a:blip r:embed="rId4">
             <a:extLst>
               <a:ext uri="{28A0092B-C50C-407E-A947-70E740481C1C}">
                 <a14:useLocalDpi xmlns:a14="http://schemas.microsoft.com/office/drawing/2010/main" val="0"/>
@@ -13824,8 +15706,8 @@
         </p:nvSpPr>
         <p:spPr>
           <a:xfrm>
-            <a:off x="1451580" y="2015734"/>
-            <a:ext cx="4533583" cy="3450613"/>
+            <a:off x="3071921" y="2058127"/>
+            <a:ext cx="4514024" cy="643543"/>
           </a:xfrm>
         </p:spPr>
         <p:txBody>
@@ -13834,34 +15716,146 @@
           </a:bodyPr>
           <a:lstStyle/>
           <a:p>
+            <a:pPr marL="0" indent="0" defTabSz="905256">
+              <a:spcBef>
+                <a:spcPts val="990"/>
+              </a:spcBef>
+              <a:buNone/>
+            </a:pPr>
             <a:r>
-              <a:rPr lang="en-US" dirty="0"/>
+              <a:rPr lang="en-US" sz="2200" kern="1200" dirty="0">
+                <a:solidFill>
+                  <a:schemeClr val="tx1"/>
+                </a:solidFill>
+                <a:effectLst/>
+                <a:latin typeface="+mn-lt"/>
+                <a:ea typeface="+mn-ea"/>
+                <a:cs typeface="+mn-cs"/>
+              </a:rPr>
               <a:t>Model 1 – Linear Regression Model</a:t>
             </a:r>
           </a:p>
           <a:p>
+            <a:endParaRPr lang="en-AU" dirty="0"/>
+          </a:p>
+        </p:txBody>
+      </p:sp>
+      <p:sp>
+        <p:nvSpPr>
+          <p:cNvPr id="4" name="TextBox 3">
+            <a:extLst>
+              <a:ext uri="{FF2B5EF4-FFF2-40B4-BE49-F238E27FC236}">
+                <a16:creationId xmlns:a16="http://schemas.microsoft.com/office/drawing/2014/main" id="{7BB027DD-E50B-400C-D640-9D765CA497C1}"/>
+              </a:ext>
+            </a:extLst>
+          </p:cNvPr>
+          <p:cNvSpPr txBox="1"/>
+          <p:nvPr/>
+        </p:nvSpPr>
+        <p:spPr>
+          <a:xfrm>
+            <a:off x="1637109" y="5564337"/>
+            <a:ext cx="5757379" cy="784830"/>
+          </a:xfrm>
+          <a:prstGeom prst="rect">
+            <a:avLst/>
+          </a:prstGeom>
+          <a:noFill/>
+        </p:spPr>
+        <p:txBody>
+          <a:bodyPr wrap="square" rtlCol="0">
+            <a:spAutoFit/>
+          </a:bodyPr>
+          <a:lstStyle/>
+          <a:p>
+            <a:pPr defTabSz="452628">
+              <a:spcAft>
+                <a:spcPts val="600"/>
+              </a:spcAft>
+            </a:pPr>
             <a:r>
-              <a:rPr lang="en-US" dirty="0"/>
+              <a:rPr lang="en-US" sz="2200" kern="1200" dirty="0">
+                <a:solidFill>
+                  <a:schemeClr val="tx1"/>
+                </a:solidFill>
+                <a:latin typeface="+mn-lt"/>
+                <a:ea typeface="+mn-ea"/>
+                <a:cs typeface="+mn-cs"/>
+              </a:rPr>
+              <a:t>Model 3 – Random Forest Regression Model</a:t>
+            </a:r>
+          </a:p>
+          <a:p>
+            <a:pPr>
+              <a:spcAft>
+                <a:spcPts val="600"/>
+              </a:spcAft>
+            </a:pPr>
+            <a:endParaRPr lang="en-AU" dirty="0"/>
+          </a:p>
+        </p:txBody>
+      </p:sp>
+      <p:sp>
+        <p:nvSpPr>
+          <p:cNvPr id="5" name="TextBox 4">
+            <a:extLst>
+              <a:ext uri="{FF2B5EF4-FFF2-40B4-BE49-F238E27FC236}">
+                <a16:creationId xmlns:a16="http://schemas.microsoft.com/office/drawing/2014/main" id="{AAAAA65A-38E1-D6FA-CB1D-4C8CE2D7824A}"/>
+              </a:ext>
+            </a:extLst>
+          </p:cNvPr>
+          <p:cNvSpPr txBox="1"/>
+          <p:nvPr/>
+        </p:nvSpPr>
+        <p:spPr>
+          <a:xfrm>
+            <a:off x="313000" y="2800498"/>
+            <a:ext cx="5158408" cy="784830"/>
+          </a:xfrm>
+          <a:prstGeom prst="rect">
+            <a:avLst/>
+          </a:prstGeom>
+          <a:noFill/>
+        </p:spPr>
+        <p:txBody>
+          <a:bodyPr wrap="square" rtlCol="0">
+            <a:spAutoFit/>
+          </a:bodyPr>
+          <a:lstStyle/>
+          <a:p>
+            <a:pPr defTabSz="452628">
+              <a:spcAft>
+                <a:spcPts val="600"/>
+              </a:spcAft>
+            </a:pPr>
+            <a:r>
+              <a:rPr lang="en-US" sz="2200" kern="1200" dirty="0">
+                <a:solidFill>
+                  <a:schemeClr val="tx1"/>
+                </a:solidFill>
+                <a:latin typeface="+mn-lt"/>
+                <a:ea typeface="+mn-ea"/>
+                <a:cs typeface="+mn-cs"/>
+              </a:rPr>
               <a:t>Model 2 – Decision Tree Regression Model</a:t>
             </a:r>
           </a:p>
           <a:p>
-            <a:r>
-              <a:rPr lang="en-US" dirty="0"/>
-              <a:t>Model 3 – Random Forest Regression Model</a:t>
-            </a:r>
-          </a:p>
-          <a:p>
+            <a:pPr>
+              <a:spcAft>
+                <a:spcPts val="600"/>
+              </a:spcAft>
+            </a:pPr>
             <a:endParaRPr lang="en-AU" dirty="0"/>
           </a:p>
         </p:txBody>
       </p:sp>
       <p:pic>
         <p:nvPicPr>
-          <p:cNvPr id="11" name="Picture 10" descr="A picture containing text, screenshot, font&#10;&#10;Description automatically generated">
+          <p:cNvPr id="7" name="Picture 6" descr="A screen shot of a computer&#10;&#10;Description automatically generated with medium confidence">
             <a:extLst>
               <a:ext uri="{FF2B5EF4-FFF2-40B4-BE49-F238E27FC236}">
-                <a16:creationId xmlns:a16="http://schemas.microsoft.com/office/drawing/2014/main" id="{CE9F130D-CD3D-96D4-D502-C0255A70F625}"/>
+                <a16:creationId xmlns:a16="http://schemas.microsoft.com/office/drawing/2014/main" id="{44BD70B5-CE46-8ACC-01F6-DCFBDA4D0BD3}"/>
               </a:ext>
             </a:extLst>
           </p:cNvPr>
@@ -13878,8 +15872,8 @@
         </p:blipFill>
         <p:spPr>
           <a:xfrm>
-            <a:off x="6128968" y="3039033"/>
-            <a:ext cx="2391342" cy="960668"/>
+            <a:off x="7585945" y="1959299"/>
+            <a:ext cx="4477375" cy="1991003"/>
           </a:xfrm>
           <a:prstGeom prst="rect">
             <a:avLst/>
@@ -13888,10 +15882,10 @@
       </p:pic>
       <p:pic>
         <p:nvPicPr>
-          <p:cNvPr id="15" name="Picture 14" descr="A picture containing text, screenshot, font&#10;&#10;Description automatically generated">
+          <p:cNvPr id="9" name="Picture 8" descr="A picture containing text, screenshot, software, font&#10;&#10;Description automatically generated">
             <a:extLst>
               <a:ext uri="{FF2B5EF4-FFF2-40B4-BE49-F238E27FC236}">
-                <a16:creationId xmlns:a16="http://schemas.microsoft.com/office/drawing/2014/main" id="{6856DD1E-16F9-1D2C-AD7A-8598B571A40E}"/>
+                <a16:creationId xmlns:a16="http://schemas.microsoft.com/office/drawing/2014/main" id="{68F41C56-FC91-DC60-7204-5B7BE9CB47F2}"/>
               </a:ext>
             </a:extLst>
           </p:cNvPr>
@@ -13908,8 +15902,8 @@
         </p:blipFill>
         <p:spPr>
           <a:xfrm>
-            <a:off x="8664115" y="2197962"/>
-            <a:ext cx="2390738" cy="681360"/>
+            <a:off x="313000" y="3242124"/>
+            <a:ext cx="6154009" cy="2000529"/>
           </a:xfrm>
           <a:prstGeom prst="rect">
             <a:avLst/>
@@ -13918,10 +15912,10 @@
       </p:pic>
       <p:pic>
         <p:nvPicPr>
-          <p:cNvPr id="13" name="Picture 12" descr="A picture containing text, screenshot, font&#10;&#10;Description automatically generated">
+          <p:cNvPr id="12" name="Picture 11" descr="A screen shot of a computer program&#10;&#10;Description automatically generated with low confidence">
             <a:extLst>
               <a:ext uri="{FF2B5EF4-FFF2-40B4-BE49-F238E27FC236}">
-                <a16:creationId xmlns:a16="http://schemas.microsoft.com/office/drawing/2014/main" id="{7A4ED7D5-8E96-63C9-6B5D-69379AFE831B}"/>
+                <a16:creationId xmlns:a16="http://schemas.microsoft.com/office/drawing/2014/main" id="{F734776D-A47F-B8E9-4E34-F756AFEE16D0}"/>
               </a:ext>
             </a:extLst>
           </p:cNvPr>
@@ -13938,8 +15932,8 @@
         </p:blipFill>
         <p:spPr>
           <a:xfrm>
-            <a:off x="8664115" y="4319358"/>
-            <a:ext cx="2390738" cy="650962"/>
+            <a:off x="6871470" y="4052952"/>
+            <a:ext cx="5191850" cy="2000529"/>
           </a:xfrm>
           <a:prstGeom prst="rect">
             <a:avLst/>
@@ -14550,10 +16544,10 @@
       </p:sp>
       <p:pic>
         <p:nvPicPr>
-          <p:cNvPr id="11" name="Picture 10" descr="A picture containing text, font, screenshot&#10;&#10;Description automatically generated">
+          <p:cNvPr id="4" name="Picture 3" descr="A picture containing text, font, screenshot&#10;&#10;Description automatically generated">
             <a:extLst>
               <a:ext uri="{FF2B5EF4-FFF2-40B4-BE49-F238E27FC236}">
-                <a16:creationId xmlns:a16="http://schemas.microsoft.com/office/drawing/2014/main" id="{2DF864FF-757F-ADB5-BE08-5F5EF9B8FFEF}"/>
+                <a16:creationId xmlns:a16="http://schemas.microsoft.com/office/drawing/2014/main" id="{B82E706E-1261-879C-A1A6-4FA3A40B4F41}"/>
               </a:ext>
             </a:extLst>
           </p:cNvPr>
@@ -14570,8 +16564,8 @@
         </p:blipFill>
         <p:spPr>
           <a:xfrm>
-            <a:off x="923334" y="3136753"/>
-            <a:ext cx="3915321" cy="1114581"/>
+            <a:off x="1447191" y="2939832"/>
+            <a:ext cx="3781953" cy="1152686"/>
           </a:xfrm>
           <a:prstGeom prst="rect">
             <a:avLst/>
@@ -14580,10 +16574,10 @@
       </p:pic>
       <p:pic>
         <p:nvPicPr>
-          <p:cNvPr id="13" name="Picture 12" descr="A picture containing text, font, screenshot&#10;&#10;Description automatically generated">
+          <p:cNvPr id="6" name="Picture 5" descr="A picture containing text, font, screenshot&#10;&#10;Description automatically generated">
             <a:extLst>
               <a:ext uri="{FF2B5EF4-FFF2-40B4-BE49-F238E27FC236}">
-                <a16:creationId xmlns:a16="http://schemas.microsoft.com/office/drawing/2014/main" id="{20CDE953-1E3C-D73A-061A-5C36BD9EC9DC}"/>
+                <a16:creationId xmlns:a16="http://schemas.microsoft.com/office/drawing/2014/main" id="{C5B9EB70-CD9A-868D-EE58-812C842B448B}"/>
               </a:ext>
             </a:extLst>
           </p:cNvPr>
@@ -14600,8 +16594,8 @@
         </p:blipFill>
         <p:spPr>
           <a:xfrm>
-            <a:off x="4166918" y="4473571"/>
-            <a:ext cx="3858163" cy="1047896"/>
+            <a:off x="4425764" y="4366222"/>
+            <a:ext cx="3887638" cy="1134299"/>
           </a:xfrm>
           <a:prstGeom prst="rect">
             <a:avLst/>
@@ -14610,10 +16604,10 @@
       </p:pic>
       <p:pic>
         <p:nvPicPr>
-          <p:cNvPr id="15" name="Picture 14" descr="A picture containing text, font, screenshot&#10;&#10;Description automatically generated">
+          <p:cNvPr id="12" name="Picture 11" descr="A picture containing text, font, screenshot&#10;&#10;Description automatically generated">
             <a:extLst>
               <a:ext uri="{FF2B5EF4-FFF2-40B4-BE49-F238E27FC236}">
-                <a16:creationId xmlns:a16="http://schemas.microsoft.com/office/drawing/2014/main" id="{5A174579-8CE2-FFCA-21C6-63D05448C510}"/>
+                <a16:creationId xmlns:a16="http://schemas.microsoft.com/office/drawing/2014/main" id="{34F77011-F508-CD58-4759-EE3451707974}"/>
               </a:ext>
             </a:extLst>
           </p:cNvPr>
@@ -14630,8 +16624,8 @@
         </p:blipFill>
         <p:spPr>
           <a:xfrm>
-            <a:off x="7699737" y="2975212"/>
-            <a:ext cx="3877216" cy="1086002"/>
+            <a:off x="7167215" y="2940990"/>
+            <a:ext cx="3887637" cy="1151528"/>
           </a:xfrm>
           <a:prstGeom prst="rect">
             <a:avLst/>
@@ -14777,64 +16771,6 @@
           </a:p>
         </p:txBody>
       </p:sp>
-      <p:pic>
-        <p:nvPicPr>
-          <p:cNvPr id="23" name="Content Placeholder 22" descr="A picture containing diagram, map, screenshot, text&#10;&#10;Description automatically generated">
-            <a:extLst>
-              <a:ext uri="{FF2B5EF4-FFF2-40B4-BE49-F238E27FC236}">
-                <a16:creationId xmlns:a16="http://schemas.microsoft.com/office/drawing/2014/main" id="{503D377D-31A4-94F3-4D12-B5ADC397B65D}"/>
-              </a:ext>
-            </a:extLst>
-          </p:cNvPr>
-          <p:cNvPicPr>
-            <a:picLocks noGrp="1" noChangeAspect="1"/>
-          </p:cNvPicPr>
-          <p:nvPr>
-            <p:ph sz="quarter" idx="4"/>
-          </p:nvPr>
-        </p:nvPicPr>
-        <p:blipFill>
-          <a:blip r:embed="rId3"/>
-          <a:stretch>
-            <a:fillRect/>
-          </a:stretch>
-        </p:blipFill>
-        <p:spPr>
-          <a:xfrm>
-            <a:off x="8379743" y="2820988"/>
-            <a:ext cx="2675109" cy="1783406"/>
-          </a:xfrm>
-        </p:spPr>
-      </p:pic>
-      <p:pic>
-        <p:nvPicPr>
-          <p:cNvPr id="21" name="Content Placeholder 20" descr="A picture containing map, diagram, text, screenshot&#10;&#10;Description automatically generated">
-            <a:extLst>
-              <a:ext uri="{FF2B5EF4-FFF2-40B4-BE49-F238E27FC236}">
-                <a16:creationId xmlns:a16="http://schemas.microsoft.com/office/drawing/2014/main" id="{753E9F91-44FB-0DA9-D701-3685C94E16B6}"/>
-              </a:ext>
-            </a:extLst>
-          </p:cNvPr>
-          <p:cNvPicPr>
-            <a:picLocks noGrp="1" noChangeAspect="1"/>
-          </p:cNvPicPr>
-          <p:nvPr>
-            <p:ph sz="half" idx="2"/>
-          </p:nvPr>
-        </p:nvPicPr>
-        <p:blipFill>
-          <a:blip r:embed="rId4"/>
-          <a:stretch>
-            <a:fillRect/>
-          </a:stretch>
-        </p:blipFill>
-        <p:spPr>
-          <a:xfrm>
-            <a:off x="1447191" y="2819978"/>
-            <a:ext cx="2676624" cy="1784416"/>
-          </a:xfrm>
-        </p:spPr>
-      </p:pic>
       <p:sp>
         <p:nvSpPr>
           <p:cNvPr id="19" name="TextBox 18">
@@ -14871,36 +16807,6 @@
           </a:p>
         </p:txBody>
       </p:sp>
-      <p:pic>
-        <p:nvPicPr>
-          <p:cNvPr id="25" name="Picture 24" descr="A picture containing text, diagram, map, screenshot&#10;&#10;Description automatically generated">
-            <a:extLst>
-              <a:ext uri="{FF2B5EF4-FFF2-40B4-BE49-F238E27FC236}">
-                <a16:creationId xmlns:a16="http://schemas.microsoft.com/office/drawing/2014/main" id="{C3C6AA87-ACC3-749E-E652-EF0303909771}"/>
-              </a:ext>
-            </a:extLst>
-          </p:cNvPr>
-          <p:cNvPicPr>
-            <a:picLocks noChangeAspect="1"/>
-          </p:cNvPicPr>
-          <p:nvPr/>
-        </p:nvPicPr>
-        <p:blipFill>
-          <a:blip r:embed="rId5"/>
-          <a:stretch>
-            <a:fillRect/>
-          </a:stretch>
-        </p:blipFill>
-        <p:spPr>
-          <a:xfrm>
-            <a:off x="4906937" y="2819978"/>
-            <a:ext cx="2676624" cy="1784416"/>
-          </a:xfrm>
-          <a:prstGeom prst="rect">
-            <a:avLst/>
-          </a:prstGeom>
-        </p:spPr>
-      </p:pic>
       <p:sp>
         <p:nvSpPr>
           <p:cNvPr id="4" name="TextBox 3">
@@ -14931,7 +16837,7 @@
           <a:p>
             <a:r>
               <a:rPr lang="en-US" dirty="0"/>
-              <a:t>Score 77.27%</a:t>
+              <a:t>Score 77.30%</a:t>
             </a:r>
             <a:endParaRPr lang="en-AU" dirty="0"/>
           </a:p>
@@ -14967,7 +16873,7 @@
           <a:p>
             <a:r>
               <a:rPr lang="en-US" dirty="0"/>
-              <a:t>Score 67.14%</a:t>
+              <a:t>Score 66.83%</a:t>
             </a:r>
             <a:endParaRPr lang="en-AU" dirty="0"/>
           </a:p>
@@ -15003,12 +16909,102 @@
           <a:p>
             <a:r>
               <a:rPr lang="en-US" dirty="0"/>
-              <a:t>Score 75.84%</a:t>
+              <a:t>Score 75.78%</a:t>
             </a:r>
             <a:endParaRPr lang="en-AU" dirty="0"/>
           </a:p>
         </p:txBody>
       </p:sp>
+      <p:pic>
+        <p:nvPicPr>
+          <p:cNvPr id="13" name="Picture 12" descr="A picture containing map, text, diagram, screenshot&#10;&#10;Description automatically generated">
+            <a:extLst>
+              <a:ext uri="{FF2B5EF4-FFF2-40B4-BE49-F238E27FC236}">
+                <a16:creationId xmlns:a16="http://schemas.microsoft.com/office/drawing/2014/main" id="{F97607FC-B01D-A6A4-95AA-6985B5CF1BF2}"/>
+              </a:ext>
+            </a:extLst>
+          </p:cNvPr>
+          <p:cNvPicPr>
+            <a:picLocks noChangeAspect="1"/>
+          </p:cNvPicPr>
+          <p:nvPr/>
+        </p:nvPicPr>
+        <p:blipFill>
+          <a:blip r:embed="rId3"/>
+          <a:stretch>
+            <a:fillRect/>
+          </a:stretch>
+        </p:blipFill>
+        <p:spPr>
+          <a:xfrm>
+            <a:off x="1447191" y="2778329"/>
+            <a:ext cx="2982245" cy="1988163"/>
+          </a:xfrm>
+          <a:prstGeom prst="rect">
+            <a:avLst/>
+          </a:prstGeom>
+        </p:spPr>
+      </p:pic>
+      <p:pic>
+        <p:nvPicPr>
+          <p:cNvPr id="15" name="Picture 14" descr="A picture containing text, diagram, map, screenshot&#10;&#10;Description automatically generated">
+            <a:extLst>
+              <a:ext uri="{FF2B5EF4-FFF2-40B4-BE49-F238E27FC236}">
+                <a16:creationId xmlns:a16="http://schemas.microsoft.com/office/drawing/2014/main" id="{05F2AC80-224E-6685-BF48-2CAEE3BD74F6}"/>
+              </a:ext>
+            </a:extLst>
+          </p:cNvPr>
+          <p:cNvPicPr>
+            <a:picLocks noChangeAspect="1"/>
+          </p:cNvPicPr>
+          <p:nvPr/>
+        </p:nvPicPr>
+        <p:blipFill>
+          <a:blip r:embed="rId4"/>
+          <a:stretch>
+            <a:fillRect/>
+          </a:stretch>
+        </p:blipFill>
+        <p:spPr>
+          <a:xfrm>
+            <a:off x="4782330" y="2816763"/>
+            <a:ext cx="2982245" cy="1988163"/>
+          </a:xfrm>
+          <a:prstGeom prst="rect">
+            <a:avLst/>
+          </a:prstGeom>
+        </p:spPr>
+      </p:pic>
+      <p:pic>
+        <p:nvPicPr>
+          <p:cNvPr id="17" name="Picture 16" descr="A picture containing text, diagram, screenshot, map&#10;&#10;Description automatically generated">
+            <a:extLst>
+              <a:ext uri="{FF2B5EF4-FFF2-40B4-BE49-F238E27FC236}">
+                <a16:creationId xmlns:a16="http://schemas.microsoft.com/office/drawing/2014/main" id="{BEB735D9-697E-F88F-0AEA-A9D59651B6FC}"/>
+              </a:ext>
+            </a:extLst>
+          </p:cNvPr>
+          <p:cNvPicPr>
+            <a:picLocks noChangeAspect="1"/>
+          </p:cNvPicPr>
+          <p:nvPr/>
+        </p:nvPicPr>
+        <p:blipFill>
+          <a:blip r:embed="rId5"/>
+          <a:stretch>
+            <a:fillRect/>
+          </a:stretch>
+        </p:blipFill>
+        <p:spPr>
+          <a:xfrm>
+            <a:off x="8072006" y="2816763"/>
+            <a:ext cx="2982246" cy="1988164"/>
+          </a:xfrm>
+          <a:prstGeom prst="rect">
+            <a:avLst/>
+          </a:prstGeom>
+        </p:spPr>
+      </p:pic>
     </p:spTree>
     <p:extLst>
       <p:ext uri="{BB962C8B-B14F-4D97-AF65-F5344CB8AC3E}">

</xml_diff>